<commit_message>
Change to use collection
</commit_message>
<xml_diff>
--- a/New Microsoft PowerPoint Presentation (3).pptx
+++ b/New Microsoft PowerPoint Presentation (3).pptx
@@ -4,12 +4,30 @@
   <p:sldMasterIdLst>
     <p:sldMasterId id="2147483726" r:id="rId1"/>
   </p:sldMasterIdLst>
+  <p:notesMasterIdLst>
+    <p:notesMasterId r:id="rId22"/>
+  </p:notesMasterIdLst>
   <p:sldIdLst>
-    <p:sldId id="256" r:id="rId2"/>
-    <p:sldId id="260" r:id="rId3"/>
-    <p:sldId id="257" r:id="rId4"/>
-    <p:sldId id="258" r:id="rId5"/>
-    <p:sldId id="259" r:id="rId6"/>
+    <p:sldId id="273" r:id="rId2"/>
+    <p:sldId id="262" r:id="rId3"/>
+    <p:sldId id="263" r:id="rId4"/>
+    <p:sldId id="274" r:id="rId5"/>
+    <p:sldId id="264" r:id="rId6"/>
+    <p:sldId id="256" r:id="rId7"/>
+    <p:sldId id="257" r:id="rId8"/>
+    <p:sldId id="265" r:id="rId9"/>
+    <p:sldId id="266" r:id="rId10"/>
+    <p:sldId id="258" r:id="rId11"/>
+    <p:sldId id="275" r:id="rId12"/>
+    <p:sldId id="276" r:id="rId13"/>
+    <p:sldId id="269" r:id="rId14"/>
+    <p:sldId id="259" r:id="rId15"/>
+    <p:sldId id="267" r:id="rId16"/>
+    <p:sldId id="270" r:id="rId17"/>
+    <p:sldId id="271" r:id="rId18"/>
+    <p:sldId id="268" r:id="rId19"/>
+    <p:sldId id="272" r:id="rId20"/>
+    <p:sldId id="277" r:id="rId21"/>
   </p:sldIdLst>
   <p:sldSz cx="12192000" cy="6858000"/>
   <p:notesSz cx="6858000" cy="9144000"/>
@@ -108,7 +126,446 @@
       </a:defRPr>
     </a:lvl9pPr>
   </p:defaultTextStyle>
+  <p:extLst>
+    <p:ext uri="{EFAFB233-063F-42B5-8137-9DF3F51BA10A}">
+      <p15:sldGuideLst xmlns:p15="http://schemas.microsoft.com/office/powerpoint/2012/main"/>
+    </p:ext>
+  </p:extLst>
 </p:presentation>
+</file>
+
+<file path=ppt/notesMasters/notesMaster1.xml><?xml version="1.0" encoding="utf-8"?>
+<p:notesMaster xmlns:a="http://schemas.openxmlformats.org/drawingml/2006/main" xmlns:r="http://schemas.openxmlformats.org/officeDocument/2006/relationships" xmlns:p="http://schemas.openxmlformats.org/presentationml/2006/main">
+  <p:cSld>
+    <p:bg>
+      <p:bgRef idx="1001">
+        <a:schemeClr val="bg1"/>
+      </p:bgRef>
+    </p:bg>
+    <p:spTree>
+      <p:nvGrpSpPr>
+        <p:cNvPr id="1" name=""/>
+        <p:cNvGrpSpPr/>
+        <p:nvPr/>
+      </p:nvGrpSpPr>
+      <p:grpSpPr>
+        <a:xfrm>
+          <a:off x="0" y="0"/>
+          <a:ext cx="0" cy="0"/>
+          <a:chOff x="0" y="0"/>
+          <a:chExt cx="0" cy="0"/>
+        </a:xfrm>
+      </p:grpSpPr>
+      <p:sp>
+        <p:nvSpPr>
+          <p:cNvPr id="2" name="Plassholder for topptekst 1"/>
+          <p:cNvSpPr>
+            <a:spLocks noGrp="1"/>
+          </p:cNvSpPr>
+          <p:nvPr>
+            <p:ph type="hdr" sz="quarter"/>
+          </p:nvPr>
+        </p:nvSpPr>
+        <p:spPr>
+          <a:xfrm>
+            <a:off x="0" y="0"/>
+            <a:ext cx="2971800" cy="458788"/>
+          </a:xfrm>
+          <a:prstGeom prst="rect">
+            <a:avLst/>
+          </a:prstGeom>
+        </p:spPr>
+        <p:txBody>
+          <a:bodyPr vert="horz" lIns="91440" tIns="45720" rIns="91440" bIns="45720" rtlCol="0"/>
+          <a:lstStyle>
+            <a:lvl1pPr algn="l">
+              <a:defRPr sz="1200"/>
+            </a:lvl1pPr>
+          </a:lstStyle>
+          <a:p>
+            <a:endParaRPr lang="en-US"/>
+          </a:p>
+        </p:txBody>
+      </p:sp>
+      <p:sp>
+        <p:nvSpPr>
+          <p:cNvPr id="3" name="Plassholder for dato 2"/>
+          <p:cNvSpPr>
+            <a:spLocks noGrp="1"/>
+          </p:cNvSpPr>
+          <p:nvPr>
+            <p:ph type="dt" idx="1"/>
+          </p:nvPr>
+        </p:nvSpPr>
+        <p:spPr>
+          <a:xfrm>
+            <a:off x="3884613" y="0"/>
+            <a:ext cx="2971800" cy="458788"/>
+          </a:xfrm>
+          <a:prstGeom prst="rect">
+            <a:avLst/>
+          </a:prstGeom>
+        </p:spPr>
+        <p:txBody>
+          <a:bodyPr vert="horz" lIns="91440" tIns="45720" rIns="91440" bIns="45720" rtlCol="0"/>
+          <a:lstStyle>
+            <a:lvl1pPr algn="r">
+              <a:defRPr sz="1200"/>
+            </a:lvl1pPr>
+          </a:lstStyle>
+          <a:p>
+            <a:fld id="{36F412BE-8F2B-4280-9F7E-F1945B09B087}" type="datetimeFigureOut">
+              <a:rPr lang="en-US" smtClean="0"/>
+              <a:t>3/1/2023</a:t>
+            </a:fld>
+            <a:endParaRPr lang="en-US"/>
+          </a:p>
+        </p:txBody>
+      </p:sp>
+      <p:sp>
+        <p:nvSpPr>
+          <p:cNvPr id="4" name="Plassholder for lysbilde 3"/>
+          <p:cNvSpPr>
+            <a:spLocks noGrp="1" noRot="1" noChangeAspect="1"/>
+          </p:cNvSpPr>
+          <p:nvPr>
+            <p:ph type="sldImg" idx="2"/>
+          </p:nvPr>
+        </p:nvSpPr>
+        <p:spPr>
+          <a:xfrm>
+            <a:off x="685800" y="1143000"/>
+            <a:ext cx="5486400" cy="3086100"/>
+          </a:xfrm>
+          <a:prstGeom prst="rect">
+            <a:avLst/>
+          </a:prstGeom>
+          <a:noFill/>
+          <a:ln w="12700">
+            <a:solidFill>
+              <a:prstClr val="black"/>
+            </a:solidFill>
+          </a:ln>
+        </p:spPr>
+        <p:txBody>
+          <a:bodyPr vert="horz" lIns="91440" tIns="45720" rIns="91440" bIns="45720" rtlCol="0" anchor="ctr"/>
+          <a:lstStyle/>
+          <a:p>
+            <a:endParaRPr lang="en-US"/>
+          </a:p>
+        </p:txBody>
+      </p:sp>
+      <p:sp>
+        <p:nvSpPr>
+          <p:cNvPr id="5" name="Plassholder for notater 4"/>
+          <p:cNvSpPr>
+            <a:spLocks noGrp="1"/>
+          </p:cNvSpPr>
+          <p:nvPr>
+            <p:ph type="body" sz="quarter" idx="3"/>
+          </p:nvPr>
+        </p:nvSpPr>
+        <p:spPr>
+          <a:xfrm>
+            <a:off x="685800" y="4400550"/>
+            <a:ext cx="5486400" cy="3600450"/>
+          </a:xfrm>
+          <a:prstGeom prst="rect">
+            <a:avLst/>
+          </a:prstGeom>
+        </p:spPr>
+        <p:txBody>
+          <a:bodyPr vert="horz" lIns="91440" tIns="45720" rIns="91440" bIns="45720" rtlCol="0"/>
+          <a:lstStyle/>
+          <a:p>
+            <a:pPr lvl="0"/>
+            <a:r>
+              <a:rPr lang="nb-NO"/>
+              <a:t>Klikk for å redigere tekststiler i malen</a:t>
+            </a:r>
+          </a:p>
+          <a:p>
+            <a:pPr lvl="1"/>
+            <a:r>
+              <a:rPr lang="nb-NO"/>
+              <a:t>Andre nivå</a:t>
+            </a:r>
+          </a:p>
+          <a:p>
+            <a:pPr lvl="2"/>
+            <a:r>
+              <a:rPr lang="nb-NO"/>
+              <a:t>Tredje nivå</a:t>
+            </a:r>
+          </a:p>
+          <a:p>
+            <a:pPr lvl="3"/>
+            <a:r>
+              <a:rPr lang="nb-NO"/>
+              <a:t>Fjerde nivå</a:t>
+            </a:r>
+          </a:p>
+          <a:p>
+            <a:pPr lvl="4"/>
+            <a:r>
+              <a:rPr lang="nb-NO"/>
+              <a:t>Femte nivå</a:t>
+            </a:r>
+            <a:endParaRPr lang="en-US"/>
+          </a:p>
+        </p:txBody>
+      </p:sp>
+      <p:sp>
+        <p:nvSpPr>
+          <p:cNvPr id="6" name="Plassholder for bunntekst 5"/>
+          <p:cNvSpPr>
+            <a:spLocks noGrp="1"/>
+          </p:cNvSpPr>
+          <p:nvPr>
+            <p:ph type="ftr" sz="quarter" idx="4"/>
+          </p:nvPr>
+        </p:nvSpPr>
+        <p:spPr>
+          <a:xfrm>
+            <a:off x="0" y="8685213"/>
+            <a:ext cx="2971800" cy="458787"/>
+          </a:xfrm>
+          <a:prstGeom prst="rect">
+            <a:avLst/>
+          </a:prstGeom>
+        </p:spPr>
+        <p:txBody>
+          <a:bodyPr vert="horz" lIns="91440" tIns="45720" rIns="91440" bIns="45720" rtlCol="0" anchor="b"/>
+          <a:lstStyle>
+            <a:lvl1pPr algn="l">
+              <a:defRPr sz="1200"/>
+            </a:lvl1pPr>
+          </a:lstStyle>
+          <a:p>
+            <a:endParaRPr lang="en-US"/>
+          </a:p>
+        </p:txBody>
+      </p:sp>
+      <p:sp>
+        <p:nvSpPr>
+          <p:cNvPr id="7" name="Plassholder for lysbildenummer 6"/>
+          <p:cNvSpPr>
+            <a:spLocks noGrp="1"/>
+          </p:cNvSpPr>
+          <p:nvPr>
+            <p:ph type="sldNum" sz="quarter" idx="5"/>
+          </p:nvPr>
+        </p:nvSpPr>
+        <p:spPr>
+          <a:xfrm>
+            <a:off x="3884613" y="8685213"/>
+            <a:ext cx="2971800" cy="458787"/>
+          </a:xfrm>
+          <a:prstGeom prst="rect">
+            <a:avLst/>
+          </a:prstGeom>
+        </p:spPr>
+        <p:txBody>
+          <a:bodyPr vert="horz" lIns="91440" tIns="45720" rIns="91440" bIns="45720" rtlCol="0" anchor="b"/>
+          <a:lstStyle>
+            <a:lvl1pPr algn="r">
+              <a:defRPr sz="1200"/>
+            </a:lvl1pPr>
+          </a:lstStyle>
+          <a:p>
+            <a:fld id="{6D562C50-4827-46EC-90CE-579A97953B9E}" type="slidenum">
+              <a:rPr lang="en-US" smtClean="0"/>
+              <a:t>‹#›</a:t>
+            </a:fld>
+            <a:endParaRPr lang="en-US"/>
+          </a:p>
+        </p:txBody>
+      </p:sp>
+    </p:spTree>
+    <p:extLst>
+      <p:ext uri="{BB962C8B-B14F-4D97-AF65-F5344CB8AC3E}">
+        <p14:creationId xmlns:p14="http://schemas.microsoft.com/office/powerpoint/2010/main" val="1141155322"/>
+      </p:ext>
+    </p:extLst>
+  </p:cSld>
+  <p:clrMap bg1="lt1" tx1="dk1" bg2="lt2" tx2="dk2" accent1="accent1" accent2="accent2" accent3="accent3" accent4="accent4" accent5="accent5" accent6="accent6" hlink="hlink" folHlink="folHlink"/>
+  <p:notesStyle>
+    <a:lvl1pPr marL="0" algn="l" defTabSz="914400" rtl="0" eaLnBrk="1" latinLnBrk="0" hangingPunct="1">
+      <a:defRPr sz="1200" kern="1200">
+        <a:solidFill>
+          <a:schemeClr val="tx1"/>
+        </a:solidFill>
+        <a:latin typeface="+mn-lt"/>
+        <a:ea typeface="+mn-ea"/>
+        <a:cs typeface="+mn-cs"/>
+      </a:defRPr>
+    </a:lvl1pPr>
+    <a:lvl2pPr marL="457200" algn="l" defTabSz="914400" rtl="0" eaLnBrk="1" latinLnBrk="0" hangingPunct="1">
+      <a:defRPr sz="1200" kern="1200">
+        <a:solidFill>
+          <a:schemeClr val="tx1"/>
+        </a:solidFill>
+        <a:latin typeface="+mn-lt"/>
+        <a:ea typeface="+mn-ea"/>
+        <a:cs typeface="+mn-cs"/>
+      </a:defRPr>
+    </a:lvl2pPr>
+    <a:lvl3pPr marL="914400" algn="l" defTabSz="914400" rtl="0" eaLnBrk="1" latinLnBrk="0" hangingPunct="1">
+      <a:defRPr sz="1200" kern="1200">
+        <a:solidFill>
+          <a:schemeClr val="tx1"/>
+        </a:solidFill>
+        <a:latin typeface="+mn-lt"/>
+        <a:ea typeface="+mn-ea"/>
+        <a:cs typeface="+mn-cs"/>
+      </a:defRPr>
+    </a:lvl3pPr>
+    <a:lvl4pPr marL="1371600" algn="l" defTabSz="914400" rtl="0" eaLnBrk="1" latinLnBrk="0" hangingPunct="1">
+      <a:defRPr sz="1200" kern="1200">
+        <a:solidFill>
+          <a:schemeClr val="tx1"/>
+        </a:solidFill>
+        <a:latin typeface="+mn-lt"/>
+        <a:ea typeface="+mn-ea"/>
+        <a:cs typeface="+mn-cs"/>
+      </a:defRPr>
+    </a:lvl4pPr>
+    <a:lvl5pPr marL="1828800" algn="l" defTabSz="914400" rtl="0" eaLnBrk="1" latinLnBrk="0" hangingPunct="1">
+      <a:defRPr sz="1200" kern="1200">
+        <a:solidFill>
+          <a:schemeClr val="tx1"/>
+        </a:solidFill>
+        <a:latin typeface="+mn-lt"/>
+        <a:ea typeface="+mn-ea"/>
+        <a:cs typeface="+mn-cs"/>
+      </a:defRPr>
+    </a:lvl5pPr>
+    <a:lvl6pPr marL="2286000" algn="l" defTabSz="914400" rtl="0" eaLnBrk="1" latinLnBrk="0" hangingPunct="1">
+      <a:defRPr sz="1200" kern="1200">
+        <a:solidFill>
+          <a:schemeClr val="tx1"/>
+        </a:solidFill>
+        <a:latin typeface="+mn-lt"/>
+        <a:ea typeface="+mn-ea"/>
+        <a:cs typeface="+mn-cs"/>
+      </a:defRPr>
+    </a:lvl6pPr>
+    <a:lvl7pPr marL="2743200" algn="l" defTabSz="914400" rtl="0" eaLnBrk="1" latinLnBrk="0" hangingPunct="1">
+      <a:defRPr sz="1200" kern="1200">
+        <a:solidFill>
+          <a:schemeClr val="tx1"/>
+        </a:solidFill>
+        <a:latin typeface="+mn-lt"/>
+        <a:ea typeface="+mn-ea"/>
+        <a:cs typeface="+mn-cs"/>
+      </a:defRPr>
+    </a:lvl7pPr>
+    <a:lvl8pPr marL="3200400" algn="l" defTabSz="914400" rtl="0" eaLnBrk="1" latinLnBrk="0" hangingPunct="1">
+      <a:defRPr sz="1200" kern="1200">
+        <a:solidFill>
+          <a:schemeClr val="tx1"/>
+        </a:solidFill>
+        <a:latin typeface="+mn-lt"/>
+        <a:ea typeface="+mn-ea"/>
+        <a:cs typeface="+mn-cs"/>
+      </a:defRPr>
+    </a:lvl8pPr>
+    <a:lvl9pPr marL="3657600" algn="l" defTabSz="914400" rtl="0" eaLnBrk="1" latinLnBrk="0" hangingPunct="1">
+      <a:defRPr sz="1200" kern="1200">
+        <a:solidFill>
+          <a:schemeClr val="tx1"/>
+        </a:solidFill>
+        <a:latin typeface="+mn-lt"/>
+        <a:ea typeface="+mn-ea"/>
+        <a:cs typeface="+mn-cs"/>
+      </a:defRPr>
+    </a:lvl9pPr>
+  </p:notesStyle>
+</p:notesMaster>
+</file>
+
+<file path=ppt/notesSlides/notesSlide1.xml><?xml version="1.0" encoding="utf-8"?>
+<p:notes xmlns:a="http://schemas.openxmlformats.org/drawingml/2006/main" xmlns:r="http://schemas.openxmlformats.org/officeDocument/2006/relationships" xmlns:p="http://schemas.openxmlformats.org/presentationml/2006/main">
+  <p:cSld>
+    <p:spTree>
+      <p:nvGrpSpPr>
+        <p:cNvPr id="1" name=""/>
+        <p:cNvGrpSpPr/>
+        <p:nvPr/>
+      </p:nvGrpSpPr>
+      <p:grpSpPr>
+        <a:xfrm>
+          <a:off x="0" y="0"/>
+          <a:ext cx="0" cy="0"/>
+          <a:chOff x="0" y="0"/>
+          <a:chExt cx="0" cy="0"/>
+        </a:xfrm>
+      </p:grpSpPr>
+      <p:sp>
+        <p:nvSpPr>
+          <p:cNvPr id="2" name="Plassholder for lysbilde 1"/>
+          <p:cNvSpPr>
+            <a:spLocks noGrp="1" noRot="1" noChangeAspect="1"/>
+          </p:cNvSpPr>
+          <p:nvPr>
+            <p:ph type="sldImg"/>
+          </p:nvPr>
+        </p:nvSpPr>
+        <p:spPr/>
+      </p:sp>
+      <p:sp>
+        <p:nvSpPr>
+          <p:cNvPr id="3" name="Plassholder for notater 2"/>
+          <p:cNvSpPr>
+            <a:spLocks noGrp="1"/>
+          </p:cNvSpPr>
+          <p:nvPr>
+            <p:ph type="body" idx="1"/>
+          </p:nvPr>
+        </p:nvSpPr>
+        <p:spPr/>
+        <p:txBody>
+          <a:bodyPr/>
+          <a:lstStyle/>
+          <a:p>
+            <a:endParaRPr lang="en-US" dirty="0"/>
+          </a:p>
+        </p:txBody>
+      </p:sp>
+      <p:sp>
+        <p:nvSpPr>
+          <p:cNvPr id="4" name="Plassholder for lysbildenummer 3"/>
+          <p:cNvSpPr>
+            <a:spLocks noGrp="1"/>
+          </p:cNvSpPr>
+          <p:nvPr>
+            <p:ph type="sldNum" sz="quarter" idx="5"/>
+          </p:nvPr>
+        </p:nvSpPr>
+        <p:spPr/>
+        <p:txBody>
+          <a:bodyPr/>
+          <a:lstStyle/>
+          <a:p>
+            <a:fld id="{6D562C50-4827-46EC-90CE-579A97953B9E}" type="slidenum">
+              <a:rPr lang="en-US" smtClean="0"/>
+              <a:t>6</a:t>
+            </a:fld>
+            <a:endParaRPr lang="en-US"/>
+          </a:p>
+        </p:txBody>
+      </p:sp>
+    </p:spTree>
+    <p:extLst>
+      <p:ext uri="{BB962C8B-B14F-4D97-AF65-F5344CB8AC3E}">
+        <p14:creationId xmlns:p14="http://schemas.microsoft.com/office/powerpoint/2010/main" val="2380723841"/>
+      </p:ext>
+    </p:extLst>
+  </p:cSld>
+  <p:clrMapOvr>
+    <a:masterClrMapping/>
+  </p:clrMapOvr>
+</p:notes>
 </file>
 
 <file path=ppt/slideLayouts/slideLayout1.xml><?xml version="1.0" encoding="utf-8"?>
@@ -296,7 +753,7 @@
           <a:p>
             <a:fld id="{C4C234E5-1AEB-47CC-867E-BF5AE7F2D26D}" type="datetimeFigureOut">
               <a:rPr lang="en-US" smtClean="0"/>
-              <a:t>2/28/2023</a:t>
+              <a:t>3/1/2023</a:t>
             </a:fld>
             <a:endParaRPr lang="en-US"/>
           </a:p>
@@ -594,7 +1051,7 @@
           <a:p>
             <a:fld id="{C4C234E5-1AEB-47CC-867E-BF5AE7F2D26D}" type="datetimeFigureOut">
               <a:rPr lang="en-US" smtClean="0"/>
-              <a:t>2/28/2023</a:t>
+              <a:t>3/1/2023</a:t>
             </a:fld>
             <a:endParaRPr lang="en-US"/>
           </a:p>
@@ -786,7 +1243,7 @@
           <a:p>
             <a:fld id="{C4C234E5-1AEB-47CC-867E-BF5AE7F2D26D}" type="datetimeFigureOut">
               <a:rPr lang="en-US" smtClean="0"/>
-              <a:t>2/28/2023</a:t>
+              <a:t>3/1/2023</a:t>
             </a:fld>
             <a:endParaRPr lang="en-US"/>
           </a:p>
@@ -1047,7 +1504,7 @@
           <a:p>
             <a:fld id="{C4C234E5-1AEB-47CC-867E-BF5AE7F2D26D}" type="datetimeFigureOut">
               <a:rPr lang="en-US" smtClean="0"/>
-              <a:t>2/28/2023</a:t>
+              <a:t>3/1/2023</a:t>
             </a:fld>
             <a:endParaRPr lang="en-US"/>
           </a:p>
@@ -1471,7 +1928,7 @@
           <a:p>
             <a:fld id="{C4C234E5-1AEB-47CC-867E-BF5AE7F2D26D}" type="datetimeFigureOut">
               <a:rPr lang="en-US" smtClean="0"/>
-              <a:t>2/28/2023</a:t>
+              <a:t>3/1/2023</a:t>
             </a:fld>
             <a:endParaRPr lang="en-US"/>
           </a:p>
@@ -2008,7 +2465,7 @@
           <a:p>
             <a:fld id="{C4C234E5-1AEB-47CC-867E-BF5AE7F2D26D}" type="datetimeFigureOut">
               <a:rPr lang="en-US" smtClean="0"/>
-              <a:t>2/28/2023</a:t>
+              <a:t>3/1/2023</a:t>
             </a:fld>
             <a:endParaRPr lang="en-US"/>
           </a:p>
@@ -2872,7 +3329,7 @@
           <a:p>
             <a:fld id="{C4C234E5-1AEB-47CC-867E-BF5AE7F2D26D}" type="datetimeFigureOut">
               <a:rPr lang="en-US" smtClean="0"/>
-              <a:t>2/28/2023</a:t>
+              <a:t>3/1/2023</a:t>
             </a:fld>
             <a:endParaRPr lang="en-US"/>
           </a:p>
@@ -3042,7 +3499,7 @@
           <a:p>
             <a:fld id="{C4C234E5-1AEB-47CC-867E-BF5AE7F2D26D}" type="datetimeFigureOut">
               <a:rPr lang="en-US" smtClean="0"/>
-              <a:t>2/28/2023</a:t>
+              <a:t>3/1/2023</a:t>
             </a:fld>
             <a:endParaRPr lang="en-US"/>
           </a:p>
@@ -3226,7 +3683,7 @@
           <a:p>
             <a:fld id="{C4C234E5-1AEB-47CC-867E-BF5AE7F2D26D}" type="datetimeFigureOut">
               <a:rPr lang="en-US" smtClean="0"/>
-              <a:t>2/28/2023</a:t>
+              <a:t>3/1/2023</a:t>
             </a:fld>
             <a:endParaRPr lang="en-US"/>
           </a:p>
@@ -3396,7 +3853,7 @@
           <a:p>
             <a:fld id="{C4C234E5-1AEB-47CC-867E-BF5AE7F2D26D}" type="datetimeFigureOut">
               <a:rPr lang="en-US" smtClean="0"/>
-              <a:t>2/28/2023</a:t>
+              <a:t>3/1/2023</a:t>
             </a:fld>
             <a:endParaRPr lang="en-US"/>
           </a:p>
@@ -3640,7 +4097,7 @@
           <a:p>
             <a:fld id="{C4C234E5-1AEB-47CC-867E-BF5AE7F2D26D}" type="datetimeFigureOut">
               <a:rPr lang="en-US" smtClean="0"/>
-              <a:t>2/28/2023</a:t>
+              <a:t>3/1/2023</a:t>
             </a:fld>
             <a:endParaRPr lang="en-US"/>
           </a:p>
@@ -3876,7 +4333,7 @@
           <a:p>
             <a:fld id="{C4C234E5-1AEB-47CC-867E-BF5AE7F2D26D}" type="datetimeFigureOut">
               <a:rPr lang="en-US" smtClean="0"/>
-              <a:t>2/28/2023</a:t>
+              <a:t>3/1/2023</a:t>
             </a:fld>
             <a:endParaRPr lang="en-US"/>
           </a:p>
@@ -4342,7 +4799,7 @@
           <a:p>
             <a:fld id="{C4C234E5-1AEB-47CC-867E-BF5AE7F2D26D}" type="datetimeFigureOut">
               <a:rPr lang="en-US" smtClean="0"/>
-              <a:t>2/28/2023</a:t>
+              <a:t>3/1/2023</a:t>
             </a:fld>
             <a:endParaRPr lang="en-US"/>
           </a:p>
@@ -4460,7 +4917,7 @@
           <a:p>
             <a:fld id="{C4C234E5-1AEB-47CC-867E-BF5AE7F2D26D}" type="datetimeFigureOut">
               <a:rPr lang="en-US" smtClean="0"/>
-              <a:t>2/28/2023</a:t>
+              <a:t>3/1/2023</a:t>
             </a:fld>
             <a:endParaRPr lang="en-US"/>
           </a:p>
@@ -4555,7 +5012,7 @@
           <a:p>
             <a:fld id="{C4C234E5-1AEB-47CC-867E-BF5AE7F2D26D}" type="datetimeFigureOut">
               <a:rPr lang="en-US" smtClean="0"/>
-              <a:t>2/28/2023</a:t>
+              <a:t>3/1/2023</a:t>
             </a:fld>
             <a:endParaRPr lang="en-US"/>
           </a:p>
@@ -4810,7 +5267,7 @@
           <a:p>
             <a:fld id="{C4C234E5-1AEB-47CC-867E-BF5AE7F2D26D}" type="datetimeFigureOut">
               <a:rPr lang="en-US" smtClean="0"/>
-              <a:t>2/28/2023</a:t>
+              <a:t>3/1/2023</a:t>
             </a:fld>
             <a:endParaRPr lang="en-US"/>
           </a:p>
@@ -5110,7 +5567,7 @@
           <a:p>
             <a:fld id="{C4C234E5-1AEB-47CC-867E-BF5AE7F2D26D}" type="datetimeFigureOut">
               <a:rPr lang="en-US" smtClean="0"/>
-              <a:t>2/28/2023</a:t>
+              <a:t>3/1/2023</a:t>
             </a:fld>
             <a:endParaRPr lang="en-US"/>
           </a:p>
@@ -5344,7 +5801,7 @@
           <a:p>
             <a:fld id="{C4C234E5-1AEB-47CC-867E-BF5AE7F2D26D}" type="datetimeFigureOut">
               <a:rPr lang="en-US" smtClean="0"/>
-              <a:t>2/28/2023</a:t>
+              <a:t>3/1/2023</a:t>
             </a:fld>
             <a:endParaRPr lang="en-US"/>
           </a:p>
@@ -6023,7 +6480,7 @@
           <p:cNvPr id="2" name="Tittel 1">
             <a:extLst>
               <a:ext uri="{FF2B5EF4-FFF2-40B4-BE49-F238E27FC236}">
-                <a16:creationId xmlns:a16="http://schemas.microsoft.com/office/drawing/2014/main" id="{E6943094-3F9B-57A2-9149-A78D4F3E8AEE}"/>
+                <a16:creationId xmlns:a16="http://schemas.microsoft.com/office/drawing/2014/main" id="{98C6381E-84B2-F572-8614-5793059C1A5F}"/>
               </a:ext>
             </a:extLst>
           </p:cNvPr>
@@ -6040,8 +6497,8 @@
           <a:lstStyle/>
           <a:p>
             <a:r>
-              <a:rPr lang="nb-NO" dirty="0" err="1"/>
-              <a:t>TestContainers</a:t>
+              <a:rPr lang="nb-NO" dirty="0"/>
+              <a:t>Prosjektet</a:t>
             </a:r>
             <a:endParaRPr lang="en-US" dirty="0"/>
           </a:p>
@@ -6052,7 +6509,7 @@
           <p:cNvPr id="3" name="Undertittel 2">
             <a:extLst>
               <a:ext uri="{FF2B5EF4-FFF2-40B4-BE49-F238E27FC236}">
-                <a16:creationId xmlns:a16="http://schemas.microsoft.com/office/drawing/2014/main" id="{84A5A177-C0A8-9154-EA60-C5662A937858}"/>
+                <a16:creationId xmlns:a16="http://schemas.microsoft.com/office/drawing/2014/main" id="{F20D6FD0-A3F8-192E-4BD6-DEB982947A1C}"/>
               </a:ext>
             </a:extLst>
           </p:cNvPr>
@@ -6068,14 +6525,1254 @@
           <a:bodyPr/>
           <a:lstStyle/>
           <a:p>
-            <a:endParaRPr lang="en-US"/>
+            <a:endParaRPr lang="en-US" dirty="0"/>
           </a:p>
         </p:txBody>
       </p:sp>
     </p:spTree>
     <p:extLst>
       <p:ext uri="{BB962C8B-B14F-4D97-AF65-F5344CB8AC3E}">
-        <p14:creationId xmlns:p14="http://schemas.microsoft.com/office/powerpoint/2010/main" val="1909991133"/>
+        <p14:creationId xmlns:p14="http://schemas.microsoft.com/office/powerpoint/2010/main" val="523786326"/>
+      </p:ext>
+    </p:extLst>
+  </p:cSld>
+  <p:clrMapOvr>
+    <a:masterClrMapping/>
+  </p:clrMapOvr>
+</p:sld>
+</file>
+
+<file path=ppt/slides/slide10.xml><?xml version="1.0" encoding="utf-8"?>
+<p:sld xmlns:a="http://schemas.openxmlformats.org/drawingml/2006/main" xmlns:r="http://schemas.openxmlformats.org/officeDocument/2006/relationships" xmlns:p="http://schemas.openxmlformats.org/presentationml/2006/main">
+  <p:cSld>
+    <p:spTree>
+      <p:nvGrpSpPr>
+        <p:cNvPr id="1" name=""/>
+        <p:cNvGrpSpPr/>
+        <p:nvPr/>
+      </p:nvGrpSpPr>
+      <p:grpSpPr>
+        <a:xfrm>
+          <a:off x="0" y="0"/>
+          <a:ext cx="0" cy="0"/>
+          <a:chOff x="0" y="0"/>
+          <a:chExt cx="0" cy="0"/>
+        </a:xfrm>
+      </p:grpSpPr>
+      <p:sp>
+        <p:nvSpPr>
+          <p:cNvPr id="2" name="Tittel 1">
+            <a:extLst>
+              <a:ext uri="{FF2B5EF4-FFF2-40B4-BE49-F238E27FC236}">
+                <a16:creationId xmlns:a16="http://schemas.microsoft.com/office/drawing/2014/main" id="{58A24ED1-C5E0-5C5E-7FD3-33C3749468FB}"/>
+              </a:ext>
+            </a:extLst>
+          </p:cNvPr>
+          <p:cNvSpPr>
+            <a:spLocks noGrp="1"/>
+          </p:cNvSpPr>
+          <p:nvPr>
+            <p:ph type="title"/>
+          </p:nvPr>
+        </p:nvSpPr>
+        <p:spPr/>
+        <p:txBody>
+          <a:bodyPr/>
+          <a:lstStyle/>
+          <a:p>
+            <a:r>
+              <a:rPr lang="nb-NO" dirty="0" err="1"/>
+              <a:t>WebApplicationFactory</a:t>
+            </a:r>
+            <a:endParaRPr lang="en-US" dirty="0"/>
+          </a:p>
+        </p:txBody>
+      </p:sp>
+      <p:pic>
+        <p:nvPicPr>
+          <p:cNvPr id="12" name="Plassholder for innhold 11">
+            <a:extLst>
+              <a:ext uri="{FF2B5EF4-FFF2-40B4-BE49-F238E27FC236}">
+                <a16:creationId xmlns:a16="http://schemas.microsoft.com/office/drawing/2014/main" id="{6F5565EC-056A-6364-AF8E-9F998771EE41}"/>
+              </a:ext>
+            </a:extLst>
+          </p:cNvPr>
+          <p:cNvPicPr>
+            <a:picLocks noGrp="1" noChangeAspect="1"/>
+          </p:cNvPicPr>
+          <p:nvPr>
+            <p:ph idx="1"/>
+          </p:nvPr>
+        </p:nvPicPr>
+        <p:blipFill>
+          <a:blip r:embed="rId2"/>
+          <a:stretch>
+            <a:fillRect/>
+          </a:stretch>
+        </p:blipFill>
+        <p:spPr>
+          <a:xfrm>
+            <a:off x="1027430" y="1580050"/>
+            <a:ext cx="8173591" cy="590632"/>
+          </a:xfrm>
+        </p:spPr>
+      </p:pic>
+      <p:pic>
+        <p:nvPicPr>
+          <p:cNvPr id="14" name="Bilde 13">
+            <a:extLst>
+              <a:ext uri="{FF2B5EF4-FFF2-40B4-BE49-F238E27FC236}">
+                <a16:creationId xmlns:a16="http://schemas.microsoft.com/office/drawing/2014/main" id="{FA0F62F3-279F-702F-B6BB-B980A97E2219}"/>
+              </a:ext>
+            </a:extLst>
+          </p:cNvPr>
+          <p:cNvPicPr>
+            <a:picLocks noChangeAspect="1"/>
+          </p:cNvPicPr>
+          <p:nvPr/>
+        </p:nvPicPr>
+        <p:blipFill>
+          <a:blip r:embed="rId3"/>
+          <a:stretch>
+            <a:fillRect/>
+          </a:stretch>
+        </p:blipFill>
+        <p:spPr>
+          <a:xfrm>
+            <a:off x="1027430" y="2381104"/>
+            <a:ext cx="9983593" cy="2095792"/>
+          </a:xfrm>
+          <a:prstGeom prst="rect">
+            <a:avLst/>
+          </a:prstGeom>
+        </p:spPr>
+      </p:pic>
+      <p:pic>
+        <p:nvPicPr>
+          <p:cNvPr id="16" name="Bilde 15">
+            <a:extLst>
+              <a:ext uri="{FF2B5EF4-FFF2-40B4-BE49-F238E27FC236}">
+                <a16:creationId xmlns:a16="http://schemas.microsoft.com/office/drawing/2014/main" id="{E2DBF9CC-6B23-AB45-CDF2-0BB8BD18B2D9}"/>
+              </a:ext>
+            </a:extLst>
+          </p:cNvPr>
+          <p:cNvPicPr>
+            <a:picLocks noChangeAspect="1"/>
+          </p:cNvPicPr>
+          <p:nvPr/>
+        </p:nvPicPr>
+        <p:blipFill>
+          <a:blip r:embed="rId4"/>
+          <a:stretch>
+            <a:fillRect/>
+          </a:stretch>
+        </p:blipFill>
+        <p:spPr>
+          <a:xfrm>
+            <a:off x="1027430" y="4684141"/>
+            <a:ext cx="6220693" cy="1133633"/>
+          </a:xfrm>
+          <a:prstGeom prst="rect">
+            <a:avLst/>
+          </a:prstGeom>
+        </p:spPr>
+      </p:pic>
+    </p:spTree>
+    <p:extLst>
+      <p:ext uri="{BB962C8B-B14F-4D97-AF65-F5344CB8AC3E}">
+        <p14:creationId xmlns:p14="http://schemas.microsoft.com/office/powerpoint/2010/main" val="143843206"/>
+      </p:ext>
+    </p:extLst>
+  </p:cSld>
+  <p:clrMapOvr>
+    <a:masterClrMapping/>
+  </p:clrMapOvr>
+</p:sld>
+</file>
+
+<file path=ppt/slides/slide11.xml><?xml version="1.0" encoding="utf-8"?>
+<p:sld xmlns:a="http://schemas.openxmlformats.org/drawingml/2006/main" xmlns:r="http://schemas.openxmlformats.org/officeDocument/2006/relationships" xmlns:p="http://schemas.openxmlformats.org/presentationml/2006/main">
+  <p:cSld>
+    <p:spTree>
+      <p:nvGrpSpPr>
+        <p:cNvPr id="1" name=""/>
+        <p:cNvGrpSpPr/>
+        <p:nvPr/>
+      </p:nvGrpSpPr>
+      <p:grpSpPr>
+        <a:xfrm>
+          <a:off x="0" y="0"/>
+          <a:ext cx="0" cy="0"/>
+          <a:chOff x="0" y="0"/>
+          <a:chExt cx="0" cy="0"/>
+        </a:xfrm>
+      </p:grpSpPr>
+      <p:sp>
+        <p:nvSpPr>
+          <p:cNvPr id="2" name="Tittel 1">
+            <a:extLst>
+              <a:ext uri="{FF2B5EF4-FFF2-40B4-BE49-F238E27FC236}">
+                <a16:creationId xmlns:a16="http://schemas.microsoft.com/office/drawing/2014/main" id="{DEDDC5E6-65CF-7BF0-9E88-04428E51AF7F}"/>
+              </a:ext>
+            </a:extLst>
+          </p:cNvPr>
+          <p:cNvSpPr>
+            <a:spLocks noGrp="1"/>
+          </p:cNvSpPr>
+          <p:nvPr>
+            <p:ph type="title"/>
+          </p:nvPr>
+        </p:nvSpPr>
+        <p:spPr/>
+        <p:txBody>
+          <a:bodyPr/>
+          <a:lstStyle/>
+          <a:p>
+            <a:r>
+              <a:rPr lang="nb-NO" dirty="0"/>
+              <a:t>Ikke bruke Testcontainer integrasjon</a:t>
+            </a:r>
+            <a:endParaRPr lang="en-US" dirty="0"/>
+          </a:p>
+        </p:txBody>
+      </p:sp>
+      <p:pic>
+        <p:nvPicPr>
+          <p:cNvPr id="5" name="Plassholder for innhold 4">
+            <a:extLst>
+              <a:ext uri="{FF2B5EF4-FFF2-40B4-BE49-F238E27FC236}">
+                <a16:creationId xmlns:a16="http://schemas.microsoft.com/office/drawing/2014/main" id="{7E1F2EA4-C743-557E-5A1F-9045C46088E3}"/>
+              </a:ext>
+            </a:extLst>
+          </p:cNvPr>
+          <p:cNvPicPr>
+            <a:picLocks noGrp="1" noChangeAspect="1"/>
+          </p:cNvPicPr>
+          <p:nvPr>
+            <p:ph idx="1"/>
+          </p:nvPr>
+        </p:nvPicPr>
+        <p:blipFill>
+          <a:blip r:embed="rId2"/>
+          <a:stretch>
+            <a:fillRect/>
+          </a:stretch>
+        </p:blipFill>
+        <p:spPr>
+          <a:xfrm>
+            <a:off x="913795" y="1866293"/>
+            <a:ext cx="10212225" cy="2238687"/>
+          </a:xfrm>
+        </p:spPr>
+      </p:pic>
+      <p:pic>
+        <p:nvPicPr>
+          <p:cNvPr id="7" name="Bilde 6">
+            <a:extLst>
+              <a:ext uri="{FF2B5EF4-FFF2-40B4-BE49-F238E27FC236}">
+                <a16:creationId xmlns:a16="http://schemas.microsoft.com/office/drawing/2014/main" id="{4FF87462-7367-1D2C-8309-D7D16B38B05F}"/>
+              </a:ext>
+            </a:extLst>
+          </p:cNvPr>
+          <p:cNvPicPr>
+            <a:picLocks noChangeAspect="1"/>
+          </p:cNvPicPr>
+          <p:nvPr/>
+        </p:nvPicPr>
+        <p:blipFill>
+          <a:blip r:embed="rId3"/>
+          <a:stretch>
+            <a:fillRect/>
+          </a:stretch>
+        </p:blipFill>
+        <p:spPr>
+          <a:xfrm>
+            <a:off x="1899789" y="4297932"/>
+            <a:ext cx="7954485" cy="933580"/>
+          </a:xfrm>
+          <a:prstGeom prst="rect">
+            <a:avLst/>
+          </a:prstGeom>
+        </p:spPr>
+      </p:pic>
+      <p:pic>
+        <p:nvPicPr>
+          <p:cNvPr id="9" name="Bilde 8">
+            <a:extLst>
+              <a:ext uri="{FF2B5EF4-FFF2-40B4-BE49-F238E27FC236}">
+                <a16:creationId xmlns:a16="http://schemas.microsoft.com/office/drawing/2014/main" id="{F0DECE79-AB98-46B7-D3E6-49C9BB1ECD64}"/>
+              </a:ext>
+            </a:extLst>
+          </p:cNvPr>
+          <p:cNvPicPr>
+            <a:picLocks noChangeAspect="1"/>
+          </p:cNvPicPr>
+          <p:nvPr/>
+        </p:nvPicPr>
+        <p:blipFill>
+          <a:blip r:embed="rId4"/>
+          <a:stretch>
+            <a:fillRect/>
+          </a:stretch>
+        </p:blipFill>
+        <p:spPr>
+          <a:xfrm>
+            <a:off x="2595191" y="5424464"/>
+            <a:ext cx="6849431" cy="333422"/>
+          </a:xfrm>
+          <a:prstGeom prst="rect">
+            <a:avLst/>
+          </a:prstGeom>
+        </p:spPr>
+      </p:pic>
+    </p:spTree>
+    <p:extLst>
+      <p:ext uri="{BB962C8B-B14F-4D97-AF65-F5344CB8AC3E}">
+        <p14:creationId xmlns:p14="http://schemas.microsoft.com/office/powerpoint/2010/main" val="2533506071"/>
+      </p:ext>
+    </p:extLst>
+  </p:cSld>
+  <p:clrMapOvr>
+    <a:masterClrMapping/>
+  </p:clrMapOvr>
+</p:sld>
+</file>
+
+<file path=ppt/slides/slide12.xml><?xml version="1.0" encoding="utf-8"?>
+<p:sld xmlns:a="http://schemas.openxmlformats.org/drawingml/2006/main" xmlns:r="http://schemas.openxmlformats.org/officeDocument/2006/relationships" xmlns:p="http://schemas.openxmlformats.org/presentationml/2006/main">
+  <p:cSld>
+    <p:spTree>
+      <p:nvGrpSpPr>
+        <p:cNvPr id="1" name=""/>
+        <p:cNvGrpSpPr/>
+        <p:nvPr/>
+      </p:nvGrpSpPr>
+      <p:grpSpPr>
+        <a:xfrm>
+          <a:off x="0" y="0"/>
+          <a:ext cx="0" cy="0"/>
+          <a:chOff x="0" y="0"/>
+          <a:chExt cx="0" cy="0"/>
+        </a:xfrm>
+      </p:grpSpPr>
+      <p:sp>
+        <p:nvSpPr>
+          <p:cNvPr id="2" name="Tittel 1">
+            <a:extLst>
+              <a:ext uri="{FF2B5EF4-FFF2-40B4-BE49-F238E27FC236}">
+                <a16:creationId xmlns:a16="http://schemas.microsoft.com/office/drawing/2014/main" id="{D290CEAE-ED5E-4732-2313-561312F46EB4}"/>
+              </a:ext>
+            </a:extLst>
+          </p:cNvPr>
+          <p:cNvSpPr>
+            <a:spLocks noGrp="1"/>
+          </p:cNvSpPr>
+          <p:nvPr>
+            <p:ph type="title"/>
+          </p:nvPr>
+        </p:nvSpPr>
+        <p:spPr/>
+        <p:txBody>
+          <a:bodyPr/>
+          <a:lstStyle/>
+          <a:p>
+            <a:r>
+              <a:rPr lang="nb-NO" dirty="0" err="1"/>
+              <a:t>IAsyncLifetime</a:t>
+            </a:r>
+            <a:endParaRPr lang="en-US" dirty="0"/>
+          </a:p>
+        </p:txBody>
+      </p:sp>
+      <p:pic>
+        <p:nvPicPr>
+          <p:cNvPr id="5" name="Plassholder for innhold 4">
+            <a:extLst>
+              <a:ext uri="{FF2B5EF4-FFF2-40B4-BE49-F238E27FC236}">
+                <a16:creationId xmlns:a16="http://schemas.microsoft.com/office/drawing/2014/main" id="{3755FEA1-DC84-ADF1-EA9C-A89215ADC9DC}"/>
+              </a:ext>
+            </a:extLst>
+          </p:cNvPr>
+          <p:cNvPicPr>
+            <a:picLocks noGrp="1" noChangeAspect="1"/>
+          </p:cNvPicPr>
+          <p:nvPr>
+            <p:ph idx="1"/>
+          </p:nvPr>
+        </p:nvPicPr>
+        <p:blipFill>
+          <a:blip r:embed="rId2"/>
+          <a:stretch>
+            <a:fillRect/>
+          </a:stretch>
+        </p:blipFill>
+        <p:spPr>
+          <a:xfrm>
+            <a:off x="2923733" y="2070658"/>
+            <a:ext cx="6335009" cy="3381847"/>
+          </a:xfrm>
+        </p:spPr>
+      </p:pic>
+    </p:spTree>
+    <p:extLst>
+      <p:ext uri="{BB962C8B-B14F-4D97-AF65-F5344CB8AC3E}">
+        <p14:creationId xmlns:p14="http://schemas.microsoft.com/office/powerpoint/2010/main" val="4228873309"/>
+      </p:ext>
+    </p:extLst>
+  </p:cSld>
+  <p:clrMapOvr>
+    <a:masterClrMapping/>
+  </p:clrMapOvr>
+</p:sld>
+</file>
+
+<file path=ppt/slides/slide13.xml><?xml version="1.0" encoding="utf-8"?>
+<p:sld xmlns:a="http://schemas.openxmlformats.org/drawingml/2006/main" xmlns:r="http://schemas.openxmlformats.org/officeDocument/2006/relationships" xmlns:p="http://schemas.openxmlformats.org/presentationml/2006/main">
+  <p:cSld>
+    <p:spTree>
+      <p:nvGrpSpPr>
+        <p:cNvPr id="1" name=""/>
+        <p:cNvGrpSpPr/>
+        <p:nvPr/>
+      </p:nvGrpSpPr>
+      <p:grpSpPr>
+        <a:xfrm>
+          <a:off x="0" y="0"/>
+          <a:ext cx="0" cy="0"/>
+          <a:chOff x="0" y="0"/>
+          <a:chExt cx="0" cy="0"/>
+        </a:xfrm>
+      </p:grpSpPr>
+      <p:sp>
+        <p:nvSpPr>
+          <p:cNvPr id="2" name="Tittel 1">
+            <a:extLst>
+              <a:ext uri="{FF2B5EF4-FFF2-40B4-BE49-F238E27FC236}">
+                <a16:creationId xmlns:a16="http://schemas.microsoft.com/office/drawing/2014/main" id="{490182FD-CC94-72D5-18D4-7E35F069D1A3}"/>
+              </a:ext>
+            </a:extLst>
+          </p:cNvPr>
+          <p:cNvSpPr>
+            <a:spLocks noGrp="1"/>
+          </p:cNvSpPr>
+          <p:nvPr>
+            <p:ph type="title"/>
+          </p:nvPr>
+        </p:nvSpPr>
+        <p:spPr>
+          <a:xfrm>
+            <a:off x="913795" y="283028"/>
+            <a:ext cx="3706889" cy="1821918"/>
+          </a:xfrm>
+        </p:spPr>
+        <p:txBody>
+          <a:bodyPr/>
+          <a:lstStyle/>
+          <a:p>
+            <a:endParaRPr lang="en-US" dirty="0"/>
+          </a:p>
+        </p:txBody>
+      </p:sp>
+      <p:pic>
+        <p:nvPicPr>
+          <p:cNvPr id="5" name="Plassholder for innhold 4">
+            <a:extLst>
+              <a:ext uri="{FF2B5EF4-FFF2-40B4-BE49-F238E27FC236}">
+                <a16:creationId xmlns:a16="http://schemas.microsoft.com/office/drawing/2014/main" id="{FD0B1E8D-88EA-5F68-E76B-8E665C15D495}"/>
+              </a:ext>
+            </a:extLst>
+          </p:cNvPr>
+          <p:cNvPicPr>
+            <a:picLocks noGrp="1" noChangeAspect="1"/>
+          </p:cNvPicPr>
+          <p:nvPr>
+            <p:ph idx="1"/>
+          </p:nvPr>
+        </p:nvPicPr>
+        <p:blipFill>
+          <a:blip r:embed="rId2"/>
+          <a:stretch>
+            <a:fillRect/>
+          </a:stretch>
+        </p:blipFill>
+        <p:spPr>
+          <a:xfrm>
+            <a:off x="5396523" y="1914314"/>
+            <a:ext cx="5468113" cy="1514686"/>
+          </a:xfrm>
+        </p:spPr>
+      </p:pic>
+      <p:sp>
+        <p:nvSpPr>
+          <p:cNvPr id="8" name="Plassholder for tekst 7">
+            <a:extLst>
+              <a:ext uri="{FF2B5EF4-FFF2-40B4-BE49-F238E27FC236}">
+                <a16:creationId xmlns:a16="http://schemas.microsoft.com/office/drawing/2014/main" id="{449BA775-15A8-A146-9149-6900139E545A}"/>
+              </a:ext>
+            </a:extLst>
+          </p:cNvPr>
+          <p:cNvSpPr>
+            <a:spLocks noGrp="1"/>
+          </p:cNvSpPr>
+          <p:nvPr>
+            <p:ph type="body" sz="half" idx="2"/>
+          </p:nvPr>
+        </p:nvSpPr>
+        <p:spPr>
+          <a:xfrm>
+            <a:off x="913795" y="2170930"/>
+            <a:ext cx="3706889" cy="3359681"/>
+          </a:xfrm>
+        </p:spPr>
+        <p:txBody>
+          <a:bodyPr/>
+          <a:lstStyle/>
+          <a:p>
+            <a:r>
+              <a:rPr lang="nb-NO" dirty="0"/>
+              <a:t>6 Konteinere, </a:t>
+            </a:r>
+            <a:br>
+              <a:rPr lang="nb-NO" dirty="0"/>
+            </a:br>
+            <a:r>
+              <a:rPr lang="nb-NO" dirty="0" err="1"/>
+              <a:t>Ryuk</a:t>
+            </a:r>
+            <a:r>
+              <a:rPr lang="nb-NO" dirty="0"/>
+              <a:t>(Testcontainer) hjelper med oppsettet.</a:t>
+            </a:r>
+            <a:endParaRPr lang="en-US" dirty="0"/>
+          </a:p>
+        </p:txBody>
+      </p:sp>
+      <p:pic>
+        <p:nvPicPr>
+          <p:cNvPr id="7" name="Bilde 6">
+            <a:extLst>
+              <a:ext uri="{FF2B5EF4-FFF2-40B4-BE49-F238E27FC236}">
+                <a16:creationId xmlns:a16="http://schemas.microsoft.com/office/drawing/2014/main" id="{3B3C3027-2A81-97C8-372B-38F702547087}"/>
+              </a:ext>
+            </a:extLst>
+          </p:cNvPr>
+          <p:cNvPicPr>
+            <a:picLocks noChangeAspect="1"/>
+          </p:cNvPicPr>
+          <p:nvPr/>
+        </p:nvPicPr>
+        <p:blipFill>
+          <a:blip r:embed="rId3"/>
+          <a:stretch>
+            <a:fillRect/>
+          </a:stretch>
+        </p:blipFill>
+        <p:spPr>
+          <a:xfrm>
+            <a:off x="137956" y="4117419"/>
+            <a:ext cx="11916088" cy="2594698"/>
+          </a:xfrm>
+          <a:prstGeom prst="rect">
+            <a:avLst/>
+          </a:prstGeom>
+        </p:spPr>
+      </p:pic>
+    </p:spTree>
+    <p:extLst>
+      <p:ext uri="{BB962C8B-B14F-4D97-AF65-F5344CB8AC3E}">
+        <p14:creationId xmlns:p14="http://schemas.microsoft.com/office/powerpoint/2010/main" val="2871182198"/>
+      </p:ext>
+    </p:extLst>
+  </p:cSld>
+  <p:clrMapOvr>
+    <a:masterClrMapping/>
+  </p:clrMapOvr>
+</p:sld>
+</file>
+
+<file path=ppt/slides/slide14.xml><?xml version="1.0" encoding="utf-8"?>
+<p:sld xmlns:a="http://schemas.openxmlformats.org/drawingml/2006/main" xmlns:r="http://schemas.openxmlformats.org/officeDocument/2006/relationships" xmlns:p="http://schemas.openxmlformats.org/presentationml/2006/main">
+  <p:cSld>
+    <p:spTree>
+      <p:nvGrpSpPr>
+        <p:cNvPr id="1" name=""/>
+        <p:cNvGrpSpPr/>
+        <p:nvPr/>
+      </p:nvGrpSpPr>
+      <p:grpSpPr>
+        <a:xfrm>
+          <a:off x="0" y="0"/>
+          <a:ext cx="0" cy="0"/>
+          <a:chOff x="0" y="0"/>
+          <a:chExt cx="0" cy="0"/>
+        </a:xfrm>
+      </p:grpSpPr>
+      <p:sp>
+        <p:nvSpPr>
+          <p:cNvPr id="2" name="Tittel 1">
+            <a:extLst>
+              <a:ext uri="{FF2B5EF4-FFF2-40B4-BE49-F238E27FC236}">
+                <a16:creationId xmlns:a16="http://schemas.microsoft.com/office/drawing/2014/main" id="{EE717783-02E8-80D5-934C-BB0DC685291F}"/>
+              </a:ext>
+            </a:extLst>
+          </p:cNvPr>
+          <p:cNvSpPr>
+            <a:spLocks noGrp="1"/>
+          </p:cNvSpPr>
+          <p:nvPr>
+            <p:ph type="title"/>
+          </p:nvPr>
+        </p:nvSpPr>
+        <p:spPr/>
+        <p:txBody>
+          <a:bodyPr/>
+          <a:lstStyle/>
+          <a:p>
+            <a:r>
+              <a:rPr lang="nb-NO" dirty="0"/>
+              <a:t>Controller eksempel</a:t>
+            </a:r>
+            <a:endParaRPr lang="en-US" dirty="0"/>
+          </a:p>
+        </p:txBody>
+      </p:sp>
+      <p:pic>
+        <p:nvPicPr>
+          <p:cNvPr id="10" name="Plassholder for innhold 9">
+            <a:extLst>
+              <a:ext uri="{FF2B5EF4-FFF2-40B4-BE49-F238E27FC236}">
+                <a16:creationId xmlns:a16="http://schemas.microsoft.com/office/drawing/2014/main" id="{FB41FEFB-D7C6-F0FA-5822-CDF166AF73B2}"/>
+              </a:ext>
+            </a:extLst>
+          </p:cNvPr>
+          <p:cNvPicPr>
+            <a:picLocks noGrp="1" noChangeAspect="1"/>
+          </p:cNvPicPr>
+          <p:nvPr>
+            <p:ph idx="1"/>
+          </p:nvPr>
+        </p:nvPicPr>
+        <p:blipFill>
+          <a:blip r:embed="rId2"/>
+          <a:stretch>
+            <a:fillRect/>
+          </a:stretch>
+        </p:blipFill>
+        <p:spPr>
+          <a:xfrm>
+            <a:off x="1583840" y="1731963"/>
+            <a:ext cx="9024320" cy="4516437"/>
+          </a:xfrm>
+          <a:prstGeom prst="rect">
+            <a:avLst/>
+          </a:prstGeom>
+        </p:spPr>
+      </p:pic>
+    </p:spTree>
+    <p:extLst>
+      <p:ext uri="{BB962C8B-B14F-4D97-AF65-F5344CB8AC3E}">
+        <p14:creationId xmlns:p14="http://schemas.microsoft.com/office/powerpoint/2010/main" val="2526513038"/>
+      </p:ext>
+    </p:extLst>
+  </p:cSld>
+  <p:clrMapOvr>
+    <a:masterClrMapping/>
+  </p:clrMapOvr>
+</p:sld>
+</file>
+
+<file path=ppt/slides/slide15.xml><?xml version="1.0" encoding="utf-8"?>
+<p:sld xmlns:a="http://schemas.openxmlformats.org/drawingml/2006/main" xmlns:r="http://schemas.openxmlformats.org/officeDocument/2006/relationships" xmlns:p="http://schemas.openxmlformats.org/presentationml/2006/main">
+  <p:cSld>
+    <p:spTree>
+      <p:nvGrpSpPr>
+        <p:cNvPr id="1" name=""/>
+        <p:cNvGrpSpPr/>
+        <p:nvPr/>
+      </p:nvGrpSpPr>
+      <p:grpSpPr>
+        <a:xfrm>
+          <a:off x="0" y="0"/>
+          <a:ext cx="0" cy="0"/>
+          <a:chOff x="0" y="0"/>
+          <a:chExt cx="0" cy="0"/>
+        </a:xfrm>
+      </p:grpSpPr>
+      <p:sp>
+        <p:nvSpPr>
+          <p:cNvPr id="2" name="Tittel 1">
+            <a:extLst>
+              <a:ext uri="{FF2B5EF4-FFF2-40B4-BE49-F238E27FC236}">
+                <a16:creationId xmlns:a16="http://schemas.microsoft.com/office/drawing/2014/main" id="{6CF4AB56-1808-ABD2-9C4C-3972579857AC}"/>
+              </a:ext>
+            </a:extLst>
+          </p:cNvPr>
+          <p:cNvSpPr>
+            <a:spLocks noGrp="1"/>
+          </p:cNvSpPr>
+          <p:nvPr>
+            <p:ph type="title"/>
+          </p:nvPr>
+        </p:nvSpPr>
+        <p:spPr/>
+        <p:txBody>
+          <a:bodyPr/>
+          <a:lstStyle/>
+          <a:p>
+            <a:r>
+              <a:rPr lang="nb-NO" dirty="0" err="1"/>
+              <a:t>Create</a:t>
+            </a:r>
+            <a:r>
+              <a:rPr lang="nb-NO" dirty="0"/>
+              <a:t> User</a:t>
+            </a:r>
+            <a:endParaRPr lang="en-US" dirty="0"/>
+          </a:p>
+        </p:txBody>
+      </p:sp>
+      <p:pic>
+        <p:nvPicPr>
+          <p:cNvPr id="5" name="Plassholder for innhold 4">
+            <a:extLst>
+              <a:ext uri="{FF2B5EF4-FFF2-40B4-BE49-F238E27FC236}">
+                <a16:creationId xmlns:a16="http://schemas.microsoft.com/office/drawing/2014/main" id="{E6052A08-A00B-BA13-7670-A3CB9BF53A0D}"/>
+              </a:ext>
+            </a:extLst>
+          </p:cNvPr>
+          <p:cNvPicPr>
+            <a:picLocks noGrp="1" noChangeAspect="1"/>
+          </p:cNvPicPr>
+          <p:nvPr>
+            <p:ph idx="1"/>
+          </p:nvPr>
+        </p:nvPicPr>
+        <p:blipFill>
+          <a:blip r:embed="rId2"/>
+          <a:stretch>
+            <a:fillRect/>
+          </a:stretch>
+        </p:blipFill>
+        <p:spPr>
+          <a:xfrm>
+            <a:off x="936650" y="1731963"/>
+            <a:ext cx="10309174" cy="4059237"/>
+          </a:xfrm>
+        </p:spPr>
+      </p:pic>
+    </p:spTree>
+    <p:extLst>
+      <p:ext uri="{BB962C8B-B14F-4D97-AF65-F5344CB8AC3E}">
+        <p14:creationId xmlns:p14="http://schemas.microsoft.com/office/powerpoint/2010/main" val="2505847831"/>
+      </p:ext>
+    </p:extLst>
+  </p:cSld>
+  <p:clrMapOvr>
+    <a:masterClrMapping/>
+  </p:clrMapOvr>
+</p:sld>
+</file>
+
+<file path=ppt/slides/slide16.xml><?xml version="1.0" encoding="utf-8"?>
+<p:sld xmlns:a="http://schemas.openxmlformats.org/drawingml/2006/main" xmlns:r="http://schemas.openxmlformats.org/officeDocument/2006/relationships" xmlns:p="http://schemas.openxmlformats.org/presentationml/2006/main">
+  <p:cSld>
+    <p:spTree>
+      <p:nvGrpSpPr>
+        <p:cNvPr id="1" name=""/>
+        <p:cNvGrpSpPr/>
+        <p:nvPr/>
+      </p:nvGrpSpPr>
+      <p:grpSpPr>
+        <a:xfrm>
+          <a:off x="0" y="0"/>
+          <a:ext cx="0" cy="0"/>
+          <a:chOff x="0" y="0"/>
+          <a:chExt cx="0" cy="0"/>
+        </a:xfrm>
+      </p:grpSpPr>
+      <p:sp>
+        <p:nvSpPr>
+          <p:cNvPr id="2" name="Tittel 1">
+            <a:extLst>
+              <a:ext uri="{FF2B5EF4-FFF2-40B4-BE49-F238E27FC236}">
+                <a16:creationId xmlns:a16="http://schemas.microsoft.com/office/drawing/2014/main" id="{A04B97AC-3AC9-C923-0501-A9667CBC0CE5}"/>
+              </a:ext>
+            </a:extLst>
+          </p:cNvPr>
+          <p:cNvSpPr>
+            <a:spLocks noGrp="1"/>
+          </p:cNvSpPr>
+          <p:nvPr>
+            <p:ph type="title"/>
+          </p:nvPr>
+        </p:nvSpPr>
+        <p:spPr/>
+        <p:txBody>
+          <a:bodyPr/>
+          <a:lstStyle/>
+          <a:p>
+            <a:r>
+              <a:rPr lang="nb-NO" dirty="0"/>
+              <a:t>Test som mislyktes</a:t>
+            </a:r>
+            <a:endParaRPr lang="en-US" dirty="0"/>
+          </a:p>
+        </p:txBody>
+      </p:sp>
+      <p:sp>
+        <p:nvSpPr>
+          <p:cNvPr id="6" name="Plassholder for tekst 5">
+            <a:extLst>
+              <a:ext uri="{FF2B5EF4-FFF2-40B4-BE49-F238E27FC236}">
+                <a16:creationId xmlns:a16="http://schemas.microsoft.com/office/drawing/2014/main" id="{274A40F7-B5FB-5459-5EE0-DE90AAD4FCE4}"/>
+              </a:ext>
+            </a:extLst>
+          </p:cNvPr>
+          <p:cNvSpPr>
+            <a:spLocks noGrp="1"/>
+          </p:cNvSpPr>
+          <p:nvPr>
+            <p:ph type="body" sz="half" idx="2"/>
+          </p:nvPr>
+        </p:nvSpPr>
+        <p:spPr/>
+        <p:txBody>
+          <a:bodyPr/>
+          <a:lstStyle/>
+          <a:p>
+            <a:r>
+              <a:rPr lang="nb-NO" dirty="0"/>
+              <a:t>Alternativer</a:t>
+            </a:r>
+          </a:p>
+          <a:p>
+            <a:pPr marL="342900" indent="-342900">
+              <a:buAutoNum type="arabicPeriod"/>
+            </a:pPr>
+            <a:r>
+              <a:rPr lang="nb-NO" dirty="0"/>
+              <a:t>Fjerne data etter test</a:t>
+            </a:r>
+          </a:p>
+          <a:p>
+            <a:pPr marL="342900" indent="-342900">
+              <a:buAutoNum type="arabicPeriod"/>
+            </a:pPr>
+            <a:r>
+              <a:rPr lang="en-US" dirty="0"/>
+              <a:t>Ny </a:t>
+            </a:r>
+            <a:r>
+              <a:rPr lang="nb-NO" dirty="0"/>
+              <a:t>instans</a:t>
+            </a:r>
+            <a:r>
+              <a:rPr lang="en-US" dirty="0"/>
+              <a:t>, med eigen docker container.</a:t>
+            </a:r>
+          </a:p>
+        </p:txBody>
+      </p:sp>
+      <p:pic>
+        <p:nvPicPr>
+          <p:cNvPr id="5" name="Plassholder for innhold 4">
+            <a:extLst>
+              <a:ext uri="{FF2B5EF4-FFF2-40B4-BE49-F238E27FC236}">
+                <a16:creationId xmlns:a16="http://schemas.microsoft.com/office/drawing/2014/main" id="{040AE727-758F-2089-5445-B0002E36E681}"/>
+              </a:ext>
+            </a:extLst>
+          </p:cNvPr>
+          <p:cNvPicPr>
+            <a:picLocks noGrp="1" noChangeAspect="1"/>
+          </p:cNvPicPr>
+          <p:nvPr>
+            <p:ph idx="4294967295"/>
+          </p:nvPr>
+        </p:nvPicPr>
+        <p:blipFill>
+          <a:blip r:embed="rId2"/>
+          <a:stretch>
+            <a:fillRect/>
+          </a:stretch>
+        </p:blipFill>
+        <p:spPr>
+          <a:xfrm>
+            <a:off x="2077375" y="3204568"/>
+            <a:ext cx="7354888" cy="676275"/>
+          </a:xfrm>
+        </p:spPr>
+      </p:pic>
+    </p:spTree>
+    <p:extLst>
+      <p:ext uri="{BB962C8B-B14F-4D97-AF65-F5344CB8AC3E}">
+        <p14:creationId xmlns:p14="http://schemas.microsoft.com/office/powerpoint/2010/main" val="278230089"/>
+      </p:ext>
+    </p:extLst>
+  </p:cSld>
+  <p:clrMapOvr>
+    <a:masterClrMapping/>
+  </p:clrMapOvr>
+</p:sld>
+</file>
+
+<file path=ppt/slides/slide17.xml><?xml version="1.0" encoding="utf-8"?>
+<p:sld xmlns:a="http://schemas.openxmlformats.org/drawingml/2006/main" xmlns:r="http://schemas.openxmlformats.org/officeDocument/2006/relationships" xmlns:p="http://schemas.openxmlformats.org/presentationml/2006/main">
+  <p:cSld>
+    <p:bg>
+      <p:bgPr>
+        <a:solidFill>
+          <a:schemeClr val="bg1"/>
+        </a:solidFill>
+        <a:effectLst/>
+      </p:bgPr>
+    </p:bg>
+    <p:spTree>
+      <p:nvGrpSpPr>
+        <p:cNvPr id="1" name=""/>
+        <p:cNvGrpSpPr/>
+        <p:nvPr/>
+      </p:nvGrpSpPr>
+      <p:grpSpPr>
+        <a:xfrm>
+          <a:off x="0" y="0"/>
+          <a:ext cx="0" cy="0"/>
+          <a:chOff x="0" y="0"/>
+          <a:chExt cx="0" cy="0"/>
+        </a:xfrm>
+      </p:grpSpPr>
+      <p:sp>
+        <p:nvSpPr>
+          <p:cNvPr id="11" name="Rectangle 10">
+            <a:extLst>
+              <a:ext uri="{FF2B5EF4-FFF2-40B4-BE49-F238E27FC236}">
+                <a16:creationId xmlns:a16="http://schemas.microsoft.com/office/drawing/2014/main" id="{95CB840F-8E41-4CA5-B79B-25CC80AD234A}"/>
+              </a:ext>
+              <a:ext uri="{C183D7F6-B498-43B3-948B-1728B52AA6E4}">
+                <adec:decorative xmlns:adec="http://schemas.microsoft.com/office/drawing/2017/decorative" val="1"/>
+              </a:ext>
+            </a:extLst>
+          </p:cNvPr>
+          <p:cNvSpPr>
+            <a:spLocks noGrp="1" noRot="1" noChangeAspect="1" noMove="1" noResize="1" noEditPoints="1" noAdjustHandles="1" noChangeArrowheads="1" noChangeShapeType="1" noTextEdit="1"/>
+          </p:cNvSpPr>
+          <p:nvPr>
+            <p:extLst>
+              <p:ext uri="{386F3935-93C4-4BCD-93E2-E3B085C9AB24}">
+                <p16:designElem xmlns:p16="http://schemas.microsoft.com/office/powerpoint/2015/main" val="1"/>
+              </p:ext>
+            </p:extLst>
+          </p:nvPr>
+        </p:nvSpPr>
+        <p:spPr>
+          <a:xfrm>
+            <a:off x="0" y="0"/>
+            <a:ext cx="12192000" cy="6858000"/>
+          </a:xfrm>
+          <a:prstGeom prst="rect">
+            <a:avLst/>
+          </a:prstGeom>
+          <a:ln>
+            <a:noFill/>
+          </a:ln>
+        </p:spPr>
+        <p:style>
+          <a:lnRef idx="2">
+            <a:schemeClr val="accent1">
+              <a:shade val="50000"/>
+            </a:schemeClr>
+          </a:lnRef>
+          <a:fillRef idx="1003">
+            <a:schemeClr val="dk2"/>
+          </a:fillRef>
+          <a:effectRef idx="0">
+            <a:schemeClr val="accent1"/>
+          </a:effectRef>
+          <a:fontRef idx="minor">
+            <a:schemeClr val="lt1"/>
+          </a:fontRef>
+        </p:style>
+        <p:txBody>
+          <a:bodyPr rtlCol="0" anchor="ctr"/>
+          <a:lstStyle/>
+          <a:p>
+            <a:pPr algn="ctr"/>
+            <a:endParaRPr lang="en-US"/>
+          </a:p>
+        </p:txBody>
+      </p:sp>
+      <p:pic>
+        <p:nvPicPr>
+          <p:cNvPr id="6" name="Bilde 5">
+            <a:extLst>
+              <a:ext uri="{FF2B5EF4-FFF2-40B4-BE49-F238E27FC236}">
+                <a16:creationId xmlns:a16="http://schemas.microsoft.com/office/drawing/2014/main" id="{A128AEA6-27AB-4D88-0544-C0F32B22F7A5}"/>
+              </a:ext>
+            </a:extLst>
+          </p:cNvPr>
+          <p:cNvPicPr>
+            <a:picLocks noChangeAspect="1"/>
+          </p:cNvPicPr>
+          <p:nvPr/>
+        </p:nvPicPr>
+        <p:blipFill>
+          <a:blip r:embed="rId2"/>
+          <a:stretch>
+            <a:fillRect/>
+          </a:stretch>
+        </p:blipFill>
+        <p:spPr>
+          <a:xfrm>
+            <a:off x="1929962" y="948707"/>
+            <a:ext cx="8332075" cy="3832755"/>
+          </a:xfrm>
+          <a:prstGeom prst="rect">
+            <a:avLst/>
+          </a:prstGeom>
+        </p:spPr>
+      </p:pic>
+      <p:pic>
+        <p:nvPicPr>
+          <p:cNvPr id="10" name="Bilde 9">
+            <a:extLst>
+              <a:ext uri="{FF2B5EF4-FFF2-40B4-BE49-F238E27FC236}">
+                <a16:creationId xmlns:a16="http://schemas.microsoft.com/office/drawing/2014/main" id="{EDF230FB-1D0C-3F98-2085-75A674ECD178}"/>
+              </a:ext>
+            </a:extLst>
+          </p:cNvPr>
+          <p:cNvPicPr>
+            <a:picLocks noChangeAspect="1"/>
+          </p:cNvPicPr>
+          <p:nvPr/>
+        </p:nvPicPr>
+        <p:blipFill>
+          <a:blip r:embed="rId3"/>
+          <a:stretch>
+            <a:fillRect/>
+          </a:stretch>
+        </p:blipFill>
+        <p:spPr>
+          <a:xfrm>
+            <a:off x="3840144" y="5255729"/>
+            <a:ext cx="4096322" cy="628738"/>
+          </a:xfrm>
+          <a:prstGeom prst="rect">
+            <a:avLst/>
+          </a:prstGeom>
+        </p:spPr>
+      </p:pic>
+    </p:spTree>
+    <p:extLst>
+      <p:ext uri="{BB962C8B-B14F-4D97-AF65-F5344CB8AC3E}">
+        <p14:creationId xmlns:p14="http://schemas.microsoft.com/office/powerpoint/2010/main" val="3787899426"/>
+      </p:ext>
+    </p:extLst>
+  </p:cSld>
+  <p:clrMapOvr>
+    <a:overrideClrMapping bg1="lt1" tx1="dk1" bg2="lt2" tx2="dk2" accent1="accent1" accent2="accent2" accent3="accent3" accent4="accent4" accent5="accent5" accent6="accent6" hlink="hlink" folHlink="folHlink"/>
+  </p:clrMapOvr>
+</p:sld>
+</file>
+
+<file path=ppt/slides/slide18.xml><?xml version="1.0" encoding="utf-8"?>
+<p:sld xmlns:a="http://schemas.openxmlformats.org/drawingml/2006/main" xmlns:r="http://schemas.openxmlformats.org/officeDocument/2006/relationships" xmlns:p="http://schemas.openxmlformats.org/presentationml/2006/main">
+  <p:cSld>
+    <p:spTree>
+      <p:nvGrpSpPr>
+        <p:cNvPr id="1" name=""/>
+        <p:cNvGrpSpPr/>
+        <p:nvPr/>
+      </p:nvGrpSpPr>
+      <p:grpSpPr>
+        <a:xfrm>
+          <a:off x="0" y="0"/>
+          <a:ext cx="0" cy="0"/>
+          <a:chOff x="0" y="0"/>
+          <a:chExt cx="0" cy="0"/>
+        </a:xfrm>
+      </p:grpSpPr>
+      <p:sp>
+        <p:nvSpPr>
+          <p:cNvPr id="2" name="Tittel 1">
+            <a:extLst>
+              <a:ext uri="{FF2B5EF4-FFF2-40B4-BE49-F238E27FC236}">
+                <a16:creationId xmlns:a16="http://schemas.microsoft.com/office/drawing/2014/main" id="{3477CEB3-1D10-CBA3-EBDF-5439BEA6DBE1}"/>
+              </a:ext>
+            </a:extLst>
+          </p:cNvPr>
+          <p:cNvSpPr>
+            <a:spLocks noGrp="1"/>
+          </p:cNvSpPr>
+          <p:nvPr>
+            <p:ph type="title"/>
+          </p:nvPr>
+        </p:nvSpPr>
+        <p:spPr/>
+        <p:txBody>
+          <a:bodyPr/>
+          <a:lstStyle/>
+          <a:p>
+            <a:r>
+              <a:rPr lang="nb-NO" dirty="0"/>
+              <a:t>Collection</a:t>
+            </a:r>
+            <a:endParaRPr lang="en-US" dirty="0"/>
+          </a:p>
+        </p:txBody>
+      </p:sp>
+      <p:sp>
+        <p:nvSpPr>
+          <p:cNvPr id="3" name="Plassholder for innhold 2">
+            <a:extLst>
+              <a:ext uri="{FF2B5EF4-FFF2-40B4-BE49-F238E27FC236}">
+                <a16:creationId xmlns:a16="http://schemas.microsoft.com/office/drawing/2014/main" id="{25A897D4-0AAD-728B-1C66-9F5DC9915D1C}"/>
+              </a:ext>
+            </a:extLst>
+          </p:cNvPr>
+          <p:cNvSpPr>
+            <a:spLocks noGrp="1"/>
+          </p:cNvSpPr>
+          <p:nvPr>
+            <p:ph idx="1"/>
+          </p:nvPr>
+        </p:nvSpPr>
+        <p:spPr/>
+        <p:txBody>
+          <a:bodyPr/>
+          <a:lstStyle/>
+          <a:p>
+            <a:r>
+              <a:rPr lang="nb-NO" dirty="0"/>
+              <a:t>Dele en database på flere test klasser.</a:t>
+            </a:r>
+            <a:endParaRPr lang="en-US" dirty="0"/>
+          </a:p>
+        </p:txBody>
+      </p:sp>
+      <p:pic>
+        <p:nvPicPr>
+          <p:cNvPr id="5" name="Bilde 4">
+            <a:extLst>
+              <a:ext uri="{FF2B5EF4-FFF2-40B4-BE49-F238E27FC236}">
+                <a16:creationId xmlns:a16="http://schemas.microsoft.com/office/drawing/2014/main" id="{4648C8E0-3225-AF42-BB7D-3C51042B183A}"/>
+              </a:ext>
+            </a:extLst>
+          </p:cNvPr>
+          <p:cNvPicPr>
+            <a:picLocks noChangeAspect="1"/>
+          </p:cNvPicPr>
+          <p:nvPr/>
+        </p:nvPicPr>
+        <p:blipFill>
+          <a:blip r:embed="rId2"/>
+          <a:stretch>
+            <a:fillRect/>
+          </a:stretch>
+        </p:blipFill>
+        <p:spPr>
+          <a:xfrm>
+            <a:off x="1694275" y="3504649"/>
+            <a:ext cx="8792802" cy="1914792"/>
+          </a:xfrm>
+          <a:prstGeom prst="rect">
+            <a:avLst/>
+          </a:prstGeom>
+        </p:spPr>
+      </p:pic>
+    </p:spTree>
+    <p:extLst>
+      <p:ext uri="{BB962C8B-B14F-4D97-AF65-F5344CB8AC3E}">
+        <p14:creationId xmlns:p14="http://schemas.microsoft.com/office/powerpoint/2010/main" val="4073356333"/>
+      </p:ext>
+    </p:extLst>
+  </p:cSld>
+  <p:clrMapOvr>
+    <a:masterClrMapping/>
+  </p:clrMapOvr>
+</p:sld>
+</file>
+
+<file path=ppt/slides/slide19.xml><?xml version="1.0" encoding="utf-8"?>
+<p:sld xmlns:a="http://schemas.openxmlformats.org/drawingml/2006/main" xmlns:r="http://schemas.openxmlformats.org/officeDocument/2006/relationships" xmlns:p="http://schemas.openxmlformats.org/presentationml/2006/main">
+  <p:cSld>
+    <p:spTree>
+      <p:nvGrpSpPr>
+        <p:cNvPr id="1" name=""/>
+        <p:cNvGrpSpPr/>
+        <p:nvPr/>
+      </p:nvGrpSpPr>
+      <p:grpSpPr>
+        <a:xfrm>
+          <a:off x="0" y="0"/>
+          <a:ext cx="0" cy="0"/>
+          <a:chOff x="0" y="0"/>
+          <a:chExt cx="0" cy="0"/>
+        </a:xfrm>
+      </p:grpSpPr>
+      <p:sp>
+        <p:nvSpPr>
+          <p:cNvPr id="2" name="Tittel 1">
+            <a:extLst>
+              <a:ext uri="{FF2B5EF4-FFF2-40B4-BE49-F238E27FC236}">
+                <a16:creationId xmlns:a16="http://schemas.microsoft.com/office/drawing/2014/main" id="{F86687DE-7D81-B05C-AF5F-FB7E6474AAE9}"/>
+              </a:ext>
+            </a:extLst>
+          </p:cNvPr>
+          <p:cNvSpPr>
+            <a:spLocks noGrp="1"/>
+          </p:cNvSpPr>
+          <p:nvPr>
+            <p:ph type="title"/>
+          </p:nvPr>
+        </p:nvSpPr>
+        <p:spPr/>
+        <p:txBody>
+          <a:bodyPr/>
+          <a:lstStyle/>
+          <a:p>
+            <a:r>
+              <a:rPr lang="nb-NO" dirty="0"/>
+              <a:t>Controller</a:t>
+            </a:r>
+            <a:endParaRPr lang="en-US" dirty="0"/>
+          </a:p>
+        </p:txBody>
+      </p:sp>
+      <p:pic>
+        <p:nvPicPr>
+          <p:cNvPr id="4" name="Plassholder for innhold 3">
+            <a:extLst>
+              <a:ext uri="{FF2B5EF4-FFF2-40B4-BE49-F238E27FC236}">
+                <a16:creationId xmlns:a16="http://schemas.microsoft.com/office/drawing/2014/main" id="{1AC0E11A-B6F4-9DCC-0F89-3E756683BD04}"/>
+              </a:ext>
+            </a:extLst>
+          </p:cNvPr>
+          <p:cNvPicPr>
+            <a:picLocks noGrp="1" noChangeAspect="1"/>
+          </p:cNvPicPr>
+          <p:nvPr>
+            <p:ph idx="1"/>
+          </p:nvPr>
+        </p:nvPicPr>
+        <p:blipFill>
+          <a:blip r:embed="rId2"/>
+          <a:stretch>
+            <a:fillRect/>
+          </a:stretch>
+        </p:blipFill>
+        <p:spPr>
+          <a:xfrm>
+            <a:off x="1332449" y="1731963"/>
+            <a:ext cx="9517577" cy="4059237"/>
+          </a:xfrm>
+          <a:prstGeom prst="rect">
+            <a:avLst/>
+          </a:prstGeom>
+        </p:spPr>
+      </p:pic>
+    </p:spTree>
+    <p:extLst>
+      <p:ext uri="{BB962C8B-B14F-4D97-AF65-F5344CB8AC3E}">
+        <p14:creationId xmlns:p14="http://schemas.microsoft.com/office/powerpoint/2010/main" val="1822430751"/>
       </p:ext>
     </p:extLst>
   </p:cSld>
@@ -6123,650 +7820,348 @@
       </p:grpSpPr>
       <p:sp>
         <p:nvSpPr>
-          <p:cNvPr id="14" name="Rectangle 7">
+          <p:cNvPr id="2" name="Tittel 1">
             <a:extLst>
               <a:ext uri="{FF2B5EF4-FFF2-40B4-BE49-F238E27FC236}">
-                <a16:creationId xmlns:a16="http://schemas.microsoft.com/office/drawing/2014/main" id="{1976BAAA-75A1-48AA-B7DE-B6B8070992D3}"/>
-              </a:ext>
-              <a:ext uri="{C183D7F6-B498-43B3-948B-1728B52AA6E4}">
-                <adec:decorative xmlns:adec="http://schemas.microsoft.com/office/drawing/2017/decorative" val="1"/>
+                <a16:creationId xmlns:a16="http://schemas.microsoft.com/office/drawing/2014/main" id="{321FCFBC-5EDF-A037-89F7-C000FB4C3ECB}"/>
               </a:ext>
             </a:extLst>
           </p:cNvPr>
           <p:cNvSpPr>
-            <a:spLocks noGrp="1" noRot="1" noChangeAspect="1" noMove="1" noResize="1" noEditPoints="1" noAdjustHandles="1" noChangeArrowheads="1" noChangeShapeType="1" noTextEdit="1"/>
-          </p:cNvSpPr>
-          <p:nvPr>
-            <p:extLst>
-              <p:ext uri="{386F3935-93C4-4BCD-93E2-E3B085C9AB24}">
-                <p16:designElem xmlns:p16="http://schemas.microsoft.com/office/powerpoint/2015/main" val="1"/>
-              </p:ext>
-            </p:extLst>
-          </p:nvPr>
-        </p:nvSpPr>
-        <p:spPr>
-          <a:xfrm>
-            <a:off x="0" y="0"/>
-            <a:ext cx="12192000" cy="6858000"/>
+            <a:spLocks noGrp="1"/>
+          </p:cNvSpPr>
+          <p:nvPr>
+            <p:ph type="title"/>
+          </p:nvPr>
+        </p:nvSpPr>
+        <p:spPr>
+          <a:xfrm>
+            <a:off x="913795" y="609600"/>
+            <a:ext cx="10353762" cy="970450"/>
+          </a:xfrm>
+        </p:spPr>
+        <p:txBody>
+          <a:bodyPr>
+            <a:normAutofit/>
+          </a:bodyPr>
+          <a:lstStyle/>
+          <a:p>
+            <a:r>
+              <a:rPr lang="nb-NO" dirty="0"/>
+              <a:t>Database</a:t>
+            </a:r>
+            <a:endParaRPr lang="en-US" dirty="0"/>
+          </a:p>
+        </p:txBody>
+      </p:sp>
+      <p:sp>
+        <p:nvSpPr>
+          <p:cNvPr id="3" name="Plassholder for innhold 2">
+            <a:extLst>
+              <a:ext uri="{FF2B5EF4-FFF2-40B4-BE49-F238E27FC236}">
+                <a16:creationId xmlns:a16="http://schemas.microsoft.com/office/drawing/2014/main" id="{01F99B6D-DE4E-891C-DE7C-DFFDF59E609C}"/>
+              </a:ext>
+            </a:extLst>
+          </p:cNvPr>
+          <p:cNvSpPr>
+            <a:spLocks noGrp="1"/>
+          </p:cNvSpPr>
+          <p:nvPr>
+            <p:ph idx="1"/>
+          </p:nvPr>
+        </p:nvSpPr>
+        <p:spPr>
+          <a:xfrm>
+            <a:off x="913795" y="1732449"/>
+            <a:ext cx="5546272" cy="4058751"/>
+          </a:xfrm>
+        </p:spPr>
+        <p:txBody>
+          <a:bodyPr anchor="ctr">
+            <a:normAutofit/>
+          </a:bodyPr>
+          <a:lstStyle/>
+          <a:p>
+            <a:pPr>
+              <a:buClr>
+                <a:srgbClr val="B98D51"/>
+              </a:buClr>
+            </a:pPr>
+            <a:r>
+              <a:rPr lang="nb-NO" dirty="0"/>
+              <a:t>For testing trenger vi en database.</a:t>
+            </a:r>
+          </a:p>
+          <a:p>
+            <a:pPr>
+              <a:buClr>
+                <a:srgbClr val="B98D51"/>
+              </a:buClr>
+            </a:pPr>
+            <a:r>
+              <a:rPr lang="nb-NO" dirty="0"/>
+              <a:t>Manuelt. </a:t>
+            </a:r>
+          </a:p>
+          <a:p>
+            <a:pPr lvl="1">
+              <a:buClr>
+                <a:srgbClr val="B98D51"/>
+              </a:buClr>
+            </a:pPr>
+            <a:r>
+              <a:rPr lang="nb-NO" dirty="0" err="1"/>
+              <a:t>Docker-compose</a:t>
+            </a:r>
+            <a:r>
+              <a:rPr lang="nb-NO" dirty="0"/>
+              <a:t> up</a:t>
+            </a:r>
+            <a:endParaRPr lang="en-US" dirty="0"/>
+          </a:p>
+          <a:p>
+            <a:pPr lvl="1">
+              <a:buClr>
+                <a:srgbClr val="B98D51"/>
+              </a:buClr>
+            </a:pPr>
+            <a:r>
+              <a:rPr lang="en-US" dirty="0"/>
+              <a:t>Start </a:t>
+            </a:r>
+          </a:p>
+          <a:p>
+            <a:pPr lvl="1">
+              <a:buClr>
+                <a:srgbClr val="B98D51"/>
+              </a:buClr>
+            </a:pPr>
+            <a:r>
+              <a:rPr lang="en-US" dirty="0"/>
+              <a:t>Stop</a:t>
+            </a:r>
+          </a:p>
+          <a:p>
+            <a:pPr lvl="1">
+              <a:buClr>
+                <a:srgbClr val="B98D51"/>
+              </a:buClr>
+            </a:pPr>
+            <a:r>
+              <a:rPr lang="en-US" dirty="0"/>
+              <a:t>Delete</a:t>
+            </a:r>
+          </a:p>
+        </p:txBody>
+      </p:sp>
+      <p:pic>
+        <p:nvPicPr>
+          <p:cNvPr id="5" name="Bilde 4" descr="Et bilde som inneholder tekst&#10;&#10;Automatisk generert beskrivelse">
+            <a:extLst>
+              <a:ext uri="{FF2B5EF4-FFF2-40B4-BE49-F238E27FC236}">
+                <a16:creationId xmlns:a16="http://schemas.microsoft.com/office/drawing/2014/main" id="{02B6D90B-7FC9-4A9B-000B-C9C0DA9DC7DA}"/>
+              </a:ext>
+            </a:extLst>
+          </p:cNvPr>
+          <p:cNvPicPr>
+            <a:picLocks noChangeAspect="1"/>
+          </p:cNvPicPr>
+          <p:nvPr/>
+        </p:nvPicPr>
+        <p:blipFill>
+          <a:blip r:embed="rId3"/>
+          <a:stretch>
+            <a:fillRect/>
+          </a:stretch>
+        </p:blipFill>
+        <p:spPr>
+          <a:xfrm>
+            <a:off x="7066560" y="2415364"/>
+            <a:ext cx="4065464" cy="2550879"/>
           </a:xfrm>
           <a:prstGeom prst="rect">
             <a:avLst/>
           </a:prstGeom>
-          <a:solidFill>
-            <a:schemeClr val="bg2">
-              <a:lumMod val="75000"/>
-              <a:lumOff val="25000"/>
-            </a:schemeClr>
-          </a:solidFill>
-          <a:ln>
-            <a:noFill/>
-          </a:ln>
-        </p:spPr>
-        <p:style>
-          <a:lnRef idx="2">
-            <a:schemeClr val="accent1">
-              <a:shade val="50000"/>
-            </a:schemeClr>
-          </a:lnRef>
-          <a:fillRef idx="1">
-            <a:schemeClr val="accent1"/>
-          </a:fillRef>
-          <a:effectRef idx="0">
-            <a:schemeClr val="accent1"/>
-          </a:effectRef>
-          <a:fontRef idx="minor">
-            <a:schemeClr val="lt1"/>
-          </a:fontRef>
-        </p:style>
-        <p:txBody>
-          <a:bodyPr rtlCol="0" anchor="ctr"/>
-          <a:lstStyle/>
-          <a:p>
-            <a:pPr algn="ctr"/>
-            <a:endParaRPr lang="en-US"/>
-          </a:p>
-        </p:txBody>
-      </p:sp>
-      <p:sp>
-        <p:nvSpPr>
-          <p:cNvPr id="3" name="Undertittel 2">
+        </p:spPr>
+      </p:pic>
+      <p:pic>
+        <p:nvPicPr>
+          <p:cNvPr id="7" name="Bilde 6">
             <a:extLst>
               <a:ext uri="{FF2B5EF4-FFF2-40B4-BE49-F238E27FC236}">
-                <a16:creationId xmlns:a16="http://schemas.microsoft.com/office/drawing/2014/main" id="{0570428B-7CE1-7508-28CE-C733ED5355C9}"/>
+                <a16:creationId xmlns:a16="http://schemas.microsoft.com/office/drawing/2014/main" id="{B72F661D-EA03-D9A2-D891-349098800E81}"/>
               </a:ext>
             </a:extLst>
           </p:cNvPr>
-          <p:cNvSpPr>
-            <a:spLocks noGrp="1"/>
-          </p:cNvSpPr>
-          <p:nvPr>
-            <p:ph type="subTitle" idx="1"/>
-          </p:nvPr>
-        </p:nvSpPr>
-        <p:spPr>
-          <a:xfrm>
-            <a:off x="8817428" y="1257301"/>
-            <a:ext cx="2450127" cy="4343399"/>
-          </a:xfrm>
-          <a:effectLst/>
-        </p:spPr>
-        <p:txBody>
-          <a:bodyPr anchor="ctr">
-            <a:normAutofit/>
-          </a:bodyPr>
-          <a:lstStyle/>
-          <a:p>
-            <a:pPr algn="l"/>
-            <a:endParaRPr lang="en-US"/>
-          </a:p>
-        </p:txBody>
-      </p:sp>
-      <p:sp useBgFill="1">
-        <p:nvSpPr>
-          <p:cNvPr id="15" name="Freeform: Shape 9">
+          <p:cNvPicPr>
+            <a:picLocks noChangeAspect="1"/>
+          </p:cNvPicPr>
+          <p:nvPr/>
+        </p:nvPicPr>
+        <p:blipFill>
+          <a:blip r:embed="rId4"/>
+          <a:stretch>
+            <a:fillRect/>
+          </a:stretch>
+        </p:blipFill>
+        <p:spPr>
+          <a:xfrm>
+            <a:off x="913795" y="5332735"/>
+            <a:ext cx="10231987" cy="1293779"/>
+          </a:xfrm>
+          <a:prstGeom prst="rect">
+            <a:avLst/>
+          </a:prstGeom>
+        </p:spPr>
+      </p:pic>
+    </p:spTree>
+    <p:extLst>
+      <p:ext uri="{BB962C8B-B14F-4D97-AF65-F5344CB8AC3E}">
+        <p14:creationId xmlns:p14="http://schemas.microsoft.com/office/powerpoint/2010/main" val="2222884607"/>
+      </p:ext>
+    </p:extLst>
+  </p:cSld>
+  <p:clrMapOvr>
+    <a:masterClrMapping/>
+  </p:clrMapOvr>
+</p:sld>
+</file>
+
+<file path=ppt/slides/slide20.xml><?xml version="1.0" encoding="utf-8"?>
+<p:sld xmlns:a="http://schemas.openxmlformats.org/drawingml/2006/main" xmlns:r="http://schemas.openxmlformats.org/officeDocument/2006/relationships" xmlns:p="http://schemas.openxmlformats.org/presentationml/2006/main">
+  <p:cSld>
+    <p:spTree>
+      <p:nvGrpSpPr>
+        <p:cNvPr id="1" name=""/>
+        <p:cNvGrpSpPr/>
+        <p:nvPr/>
+      </p:nvGrpSpPr>
+      <p:grpSpPr>
+        <a:xfrm>
+          <a:off x="0" y="0"/>
+          <a:ext cx="0" cy="0"/>
+          <a:chOff x="0" y="0"/>
+          <a:chExt cx="0" cy="0"/>
+        </a:xfrm>
+      </p:grpSpPr>
+      <p:sp>
+        <p:nvSpPr>
+          <p:cNvPr id="2" name="Tittel 1">
             <a:extLst>
               <a:ext uri="{FF2B5EF4-FFF2-40B4-BE49-F238E27FC236}">
-                <a16:creationId xmlns:a16="http://schemas.microsoft.com/office/drawing/2014/main" id="{65A5F259-CDF7-4A15-A66C-A9939D23E346}"/>
-              </a:ext>
-              <a:ext uri="{C183D7F6-B498-43B3-948B-1728B52AA6E4}">
-                <adec:decorative xmlns:adec="http://schemas.microsoft.com/office/drawing/2017/decorative" val="1"/>
+                <a16:creationId xmlns:a16="http://schemas.microsoft.com/office/drawing/2014/main" id="{DA660E35-E1CC-04F4-EA21-D1AC9B6EC9A0}"/>
               </a:ext>
             </a:extLst>
           </p:cNvPr>
           <p:cNvSpPr>
-            <a:spLocks noGrp="1" noRot="1" noChangeAspect="1" noMove="1" noResize="1" noEditPoints="1" noAdjustHandles="1" noChangeArrowheads="1" noChangeShapeType="1" noTextEdit="1"/>
-          </p:cNvSpPr>
-          <p:nvPr>
-            <p:extLst>
-              <p:ext uri="{386F3935-93C4-4BCD-93E2-E3B085C9AB24}">
-                <p16:designElem xmlns:p16="http://schemas.microsoft.com/office/powerpoint/2015/main" val="1"/>
-              </p:ext>
-            </p:extLst>
-          </p:nvPr>
-        </p:nvSpPr>
-        <p:spPr>
-          <a:xfrm>
-            <a:off x="1" y="-2"/>
-            <a:ext cx="8386486" cy="6858002"/>
-          </a:xfrm>
-          <a:custGeom>
-            <a:avLst/>
-            <a:gdLst>
-              <a:gd name="connsiteX0" fmla="*/ 0 w 6088489"/>
-              <a:gd name="connsiteY0" fmla="*/ 0 h 6858002"/>
-              <a:gd name="connsiteX1" fmla="*/ 3563332 w 6088489"/>
-              <a:gd name="connsiteY1" fmla="*/ 0 h 6858002"/>
-              <a:gd name="connsiteX2" fmla="*/ 3563332 w 6088489"/>
-              <a:gd name="connsiteY2" fmla="*/ 3 h 6858002"/>
-              <a:gd name="connsiteX3" fmla="*/ 5842099 w 6088489"/>
-              <a:gd name="connsiteY3" fmla="*/ 3 h 6858002"/>
-              <a:gd name="connsiteX4" fmla="*/ 5842099 w 6088489"/>
-              <a:gd name="connsiteY4" fmla="*/ 4 h 6858002"/>
-              <a:gd name="connsiteX5" fmla="*/ 5835346 w 6088489"/>
-              <a:gd name="connsiteY5" fmla="*/ 4 h 6858002"/>
-              <a:gd name="connsiteX6" fmla="*/ 5841229 w 6088489"/>
-              <a:gd name="connsiteY6" fmla="*/ 40466 h 6858002"/>
-              <a:gd name="connsiteX7" fmla="*/ 5858543 w 6088489"/>
-              <a:gd name="connsiteY7" fmla="*/ 159110 h 6858002"/>
-              <a:gd name="connsiteX8" fmla="*/ 5870645 w 6088489"/>
-              <a:gd name="connsiteY8" fmla="*/ 245521 h 6858002"/>
-              <a:gd name="connsiteX9" fmla="*/ 5883420 w 6088489"/>
-              <a:gd name="connsiteY9" fmla="*/ 348391 h 6858002"/>
-              <a:gd name="connsiteX10" fmla="*/ 5898716 w 6088489"/>
-              <a:gd name="connsiteY10" fmla="*/ 470463 h 6858002"/>
-              <a:gd name="connsiteX11" fmla="*/ 5914853 w 6088489"/>
-              <a:gd name="connsiteY11" fmla="*/ 605566 h 6858002"/>
-              <a:gd name="connsiteX12" fmla="*/ 5931830 w 6088489"/>
-              <a:gd name="connsiteY12" fmla="*/ 757813 h 6858002"/>
-              <a:gd name="connsiteX13" fmla="*/ 5949815 w 6088489"/>
-              <a:gd name="connsiteY13" fmla="*/ 923777 h 6858002"/>
-              <a:gd name="connsiteX14" fmla="*/ 5967801 w 6088489"/>
-              <a:gd name="connsiteY14" fmla="*/ 1104142 h 6858002"/>
-              <a:gd name="connsiteX15" fmla="*/ 5986122 w 6088489"/>
-              <a:gd name="connsiteY15" fmla="*/ 1296166 h 6858002"/>
-              <a:gd name="connsiteX16" fmla="*/ 6003099 w 6088489"/>
-              <a:gd name="connsiteY16" fmla="*/ 1503278 h 6858002"/>
-              <a:gd name="connsiteX17" fmla="*/ 6019404 w 6088489"/>
-              <a:gd name="connsiteY17" fmla="*/ 1719991 h 6858002"/>
-              <a:gd name="connsiteX18" fmla="*/ 6034196 w 6088489"/>
-              <a:gd name="connsiteY18" fmla="*/ 1949048 h 6858002"/>
-              <a:gd name="connsiteX19" fmla="*/ 6048315 w 6088489"/>
-              <a:gd name="connsiteY19" fmla="*/ 2187706 h 6858002"/>
-              <a:gd name="connsiteX20" fmla="*/ 6061595 w 6088489"/>
-              <a:gd name="connsiteY20" fmla="*/ 2436652 h 6858002"/>
-              <a:gd name="connsiteX21" fmla="*/ 6066301 w 6088489"/>
-              <a:gd name="connsiteY21" fmla="*/ 2564211 h 6858002"/>
-              <a:gd name="connsiteX22" fmla="*/ 6071512 w 6088489"/>
-              <a:gd name="connsiteY22" fmla="*/ 2694512 h 6858002"/>
-              <a:gd name="connsiteX23" fmla="*/ 6076386 w 6088489"/>
-              <a:gd name="connsiteY23" fmla="*/ 2826871 h 6858002"/>
-              <a:gd name="connsiteX24" fmla="*/ 6079580 w 6088489"/>
-              <a:gd name="connsiteY24" fmla="*/ 2959917 h 6858002"/>
-              <a:gd name="connsiteX25" fmla="*/ 6082438 w 6088489"/>
-              <a:gd name="connsiteY25" fmla="*/ 3095705 h 6858002"/>
-              <a:gd name="connsiteX26" fmla="*/ 6085463 w 6088489"/>
-              <a:gd name="connsiteY26" fmla="*/ 3232865 h 6858002"/>
-              <a:gd name="connsiteX27" fmla="*/ 6087480 w 6088489"/>
-              <a:gd name="connsiteY27" fmla="*/ 3372768 h 6858002"/>
-              <a:gd name="connsiteX28" fmla="*/ 6087480 w 6088489"/>
-              <a:gd name="connsiteY28" fmla="*/ 3514043 h 6858002"/>
-              <a:gd name="connsiteX29" fmla="*/ 6088489 w 6088489"/>
-              <a:gd name="connsiteY29" fmla="*/ 3656689 h 6858002"/>
-              <a:gd name="connsiteX30" fmla="*/ 6087480 w 6088489"/>
-              <a:gd name="connsiteY30" fmla="*/ 3800707 h 6858002"/>
-              <a:gd name="connsiteX31" fmla="*/ 6085463 w 6088489"/>
-              <a:gd name="connsiteY31" fmla="*/ 3946783 h 6858002"/>
-              <a:gd name="connsiteX32" fmla="*/ 6083614 w 6088489"/>
-              <a:gd name="connsiteY32" fmla="*/ 4092858 h 6858002"/>
-              <a:gd name="connsiteX33" fmla="*/ 6079580 w 6088489"/>
-              <a:gd name="connsiteY33" fmla="*/ 4240991 h 6858002"/>
-              <a:gd name="connsiteX34" fmla="*/ 6075378 w 6088489"/>
-              <a:gd name="connsiteY34" fmla="*/ 4390495 h 6858002"/>
-              <a:gd name="connsiteX35" fmla="*/ 6070503 w 6088489"/>
-              <a:gd name="connsiteY35" fmla="*/ 4540000 h 6858002"/>
-              <a:gd name="connsiteX36" fmla="*/ 6063612 w 6088489"/>
-              <a:gd name="connsiteY36" fmla="*/ 4690876 h 6858002"/>
-              <a:gd name="connsiteX37" fmla="*/ 6055375 w 6088489"/>
-              <a:gd name="connsiteY37" fmla="*/ 4843123 h 6858002"/>
-              <a:gd name="connsiteX38" fmla="*/ 6047475 w 6088489"/>
-              <a:gd name="connsiteY38" fmla="*/ 4996057 h 6858002"/>
-              <a:gd name="connsiteX39" fmla="*/ 6037390 w 6088489"/>
-              <a:gd name="connsiteY39" fmla="*/ 5148990 h 6858002"/>
-              <a:gd name="connsiteX40" fmla="*/ 6025287 w 6088489"/>
-              <a:gd name="connsiteY40" fmla="*/ 5303981 h 6858002"/>
-              <a:gd name="connsiteX41" fmla="*/ 6013185 w 6088489"/>
-              <a:gd name="connsiteY41" fmla="*/ 5456914 h 6858002"/>
-              <a:gd name="connsiteX42" fmla="*/ 5999233 w 6088489"/>
-              <a:gd name="connsiteY42" fmla="*/ 5612591 h 6858002"/>
-              <a:gd name="connsiteX43" fmla="*/ 5983937 w 6088489"/>
-              <a:gd name="connsiteY43" fmla="*/ 5768953 h 6858002"/>
-              <a:gd name="connsiteX44" fmla="*/ 5967801 w 6088489"/>
-              <a:gd name="connsiteY44" fmla="*/ 5923258 h 6858002"/>
-              <a:gd name="connsiteX45" fmla="*/ 5948975 w 6088489"/>
-              <a:gd name="connsiteY45" fmla="*/ 6079621 h 6858002"/>
-              <a:gd name="connsiteX46" fmla="*/ 5928804 w 6088489"/>
-              <a:gd name="connsiteY46" fmla="*/ 6235297 h 6858002"/>
-              <a:gd name="connsiteX47" fmla="*/ 5908801 w 6088489"/>
-              <a:gd name="connsiteY47" fmla="*/ 6391660 h 6858002"/>
-              <a:gd name="connsiteX48" fmla="*/ 5885437 w 6088489"/>
-              <a:gd name="connsiteY48" fmla="*/ 6547336 h 6858002"/>
-              <a:gd name="connsiteX49" fmla="*/ 5861568 w 6088489"/>
-              <a:gd name="connsiteY49" fmla="*/ 6702327 h 6858002"/>
-              <a:gd name="connsiteX50" fmla="*/ 5836524 w 6088489"/>
-              <a:gd name="connsiteY50" fmla="*/ 6858002 h 6858002"/>
-              <a:gd name="connsiteX51" fmla="*/ 3563332 w 6088489"/>
-              <a:gd name="connsiteY51" fmla="*/ 6858002 h 6858002"/>
-              <a:gd name="connsiteX52" fmla="*/ 1223490 w 6088489"/>
-              <a:gd name="connsiteY52" fmla="*/ 6858002 h 6858002"/>
-              <a:gd name="connsiteX53" fmla="*/ 0 w 6088489"/>
-              <a:gd name="connsiteY53" fmla="*/ 6858002 h 6858002"/>
-            </a:gdLst>
-            <a:ahLst/>
-            <a:cxnLst>
-              <a:cxn ang="0">
-                <a:pos x="connsiteX0" y="connsiteY0"/>
-              </a:cxn>
-              <a:cxn ang="0">
-                <a:pos x="connsiteX1" y="connsiteY1"/>
-              </a:cxn>
-              <a:cxn ang="0">
-                <a:pos x="connsiteX2" y="connsiteY2"/>
-              </a:cxn>
-              <a:cxn ang="0">
-                <a:pos x="connsiteX3" y="connsiteY3"/>
-              </a:cxn>
-              <a:cxn ang="0">
-                <a:pos x="connsiteX4" y="connsiteY4"/>
-              </a:cxn>
-              <a:cxn ang="0">
-                <a:pos x="connsiteX5" y="connsiteY5"/>
-              </a:cxn>
-              <a:cxn ang="0">
-                <a:pos x="connsiteX6" y="connsiteY6"/>
-              </a:cxn>
-              <a:cxn ang="0">
-                <a:pos x="connsiteX7" y="connsiteY7"/>
-              </a:cxn>
-              <a:cxn ang="0">
-                <a:pos x="connsiteX8" y="connsiteY8"/>
-              </a:cxn>
-              <a:cxn ang="0">
-                <a:pos x="connsiteX9" y="connsiteY9"/>
-              </a:cxn>
-              <a:cxn ang="0">
-                <a:pos x="connsiteX10" y="connsiteY10"/>
-              </a:cxn>
-              <a:cxn ang="0">
-                <a:pos x="connsiteX11" y="connsiteY11"/>
-              </a:cxn>
-              <a:cxn ang="0">
-                <a:pos x="connsiteX12" y="connsiteY12"/>
-              </a:cxn>
-              <a:cxn ang="0">
-                <a:pos x="connsiteX13" y="connsiteY13"/>
-              </a:cxn>
-              <a:cxn ang="0">
-                <a:pos x="connsiteX14" y="connsiteY14"/>
-              </a:cxn>
-              <a:cxn ang="0">
-                <a:pos x="connsiteX15" y="connsiteY15"/>
-              </a:cxn>
-              <a:cxn ang="0">
-                <a:pos x="connsiteX16" y="connsiteY16"/>
-              </a:cxn>
-              <a:cxn ang="0">
-                <a:pos x="connsiteX17" y="connsiteY17"/>
-              </a:cxn>
-              <a:cxn ang="0">
-                <a:pos x="connsiteX18" y="connsiteY18"/>
-              </a:cxn>
-              <a:cxn ang="0">
-                <a:pos x="connsiteX19" y="connsiteY19"/>
-              </a:cxn>
-              <a:cxn ang="0">
-                <a:pos x="connsiteX20" y="connsiteY20"/>
-              </a:cxn>
-              <a:cxn ang="0">
-                <a:pos x="connsiteX21" y="connsiteY21"/>
-              </a:cxn>
-              <a:cxn ang="0">
-                <a:pos x="connsiteX22" y="connsiteY22"/>
-              </a:cxn>
-              <a:cxn ang="0">
-                <a:pos x="connsiteX23" y="connsiteY23"/>
-              </a:cxn>
-              <a:cxn ang="0">
-                <a:pos x="connsiteX24" y="connsiteY24"/>
-              </a:cxn>
-              <a:cxn ang="0">
-                <a:pos x="connsiteX25" y="connsiteY25"/>
-              </a:cxn>
-              <a:cxn ang="0">
-                <a:pos x="connsiteX26" y="connsiteY26"/>
-              </a:cxn>
-              <a:cxn ang="0">
-                <a:pos x="connsiteX27" y="connsiteY27"/>
-              </a:cxn>
-              <a:cxn ang="0">
-                <a:pos x="connsiteX28" y="connsiteY28"/>
-              </a:cxn>
-              <a:cxn ang="0">
-                <a:pos x="connsiteX29" y="connsiteY29"/>
-              </a:cxn>
-              <a:cxn ang="0">
-                <a:pos x="connsiteX30" y="connsiteY30"/>
-              </a:cxn>
-              <a:cxn ang="0">
-                <a:pos x="connsiteX31" y="connsiteY31"/>
-              </a:cxn>
-              <a:cxn ang="0">
-                <a:pos x="connsiteX32" y="connsiteY32"/>
-              </a:cxn>
-              <a:cxn ang="0">
-                <a:pos x="connsiteX33" y="connsiteY33"/>
-              </a:cxn>
-              <a:cxn ang="0">
-                <a:pos x="connsiteX34" y="connsiteY34"/>
-              </a:cxn>
-              <a:cxn ang="0">
-                <a:pos x="connsiteX35" y="connsiteY35"/>
-              </a:cxn>
-              <a:cxn ang="0">
-                <a:pos x="connsiteX36" y="connsiteY36"/>
-              </a:cxn>
-              <a:cxn ang="0">
-                <a:pos x="connsiteX37" y="connsiteY37"/>
-              </a:cxn>
-              <a:cxn ang="0">
-                <a:pos x="connsiteX38" y="connsiteY38"/>
-              </a:cxn>
-              <a:cxn ang="0">
-                <a:pos x="connsiteX39" y="connsiteY39"/>
-              </a:cxn>
-              <a:cxn ang="0">
-                <a:pos x="connsiteX40" y="connsiteY40"/>
-              </a:cxn>
-              <a:cxn ang="0">
-                <a:pos x="connsiteX41" y="connsiteY41"/>
-              </a:cxn>
-              <a:cxn ang="0">
-                <a:pos x="connsiteX42" y="connsiteY42"/>
-              </a:cxn>
-              <a:cxn ang="0">
-                <a:pos x="connsiteX43" y="connsiteY43"/>
-              </a:cxn>
-              <a:cxn ang="0">
-                <a:pos x="connsiteX44" y="connsiteY44"/>
-              </a:cxn>
-              <a:cxn ang="0">
-                <a:pos x="connsiteX45" y="connsiteY45"/>
-              </a:cxn>
-              <a:cxn ang="0">
-                <a:pos x="connsiteX46" y="connsiteY46"/>
-              </a:cxn>
-              <a:cxn ang="0">
-                <a:pos x="connsiteX47" y="connsiteY47"/>
-              </a:cxn>
-              <a:cxn ang="0">
-                <a:pos x="connsiteX48" y="connsiteY48"/>
-              </a:cxn>
-              <a:cxn ang="0">
-                <a:pos x="connsiteX49" y="connsiteY49"/>
-              </a:cxn>
-              <a:cxn ang="0">
-                <a:pos x="connsiteX50" y="connsiteY50"/>
-              </a:cxn>
-              <a:cxn ang="0">
-                <a:pos x="connsiteX51" y="connsiteY51"/>
-              </a:cxn>
-              <a:cxn ang="0">
-                <a:pos x="connsiteX52" y="connsiteY52"/>
-              </a:cxn>
-              <a:cxn ang="0">
-                <a:pos x="connsiteX53" y="connsiteY53"/>
-              </a:cxn>
-            </a:cxnLst>
-            <a:rect l="l" t="t" r="r" b="b"/>
-            <a:pathLst>
-              <a:path w="6088489" h="6858002">
-                <a:moveTo>
-                  <a:pt x="0" y="0"/>
-                </a:moveTo>
-                <a:lnTo>
-                  <a:pt x="3563332" y="0"/>
-                </a:lnTo>
-                <a:lnTo>
-                  <a:pt x="3563332" y="3"/>
-                </a:lnTo>
-                <a:lnTo>
-                  <a:pt x="5842099" y="3"/>
-                </a:lnTo>
-                <a:lnTo>
-                  <a:pt x="5842099" y="4"/>
-                </a:lnTo>
-                <a:lnTo>
-                  <a:pt x="5835346" y="4"/>
-                </a:lnTo>
-                <a:lnTo>
-                  <a:pt x="5841229" y="40466"/>
-                </a:lnTo>
-                <a:lnTo>
-                  <a:pt x="5858543" y="159110"/>
-                </a:lnTo>
-                <a:lnTo>
-                  <a:pt x="5870645" y="245521"/>
-                </a:lnTo>
-                <a:lnTo>
-                  <a:pt x="5883420" y="348391"/>
-                </a:lnTo>
-                <a:lnTo>
-                  <a:pt x="5898716" y="470463"/>
-                </a:lnTo>
-                <a:lnTo>
-                  <a:pt x="5914853" y="605566"/>
-                </a:lnTo>
-                <a:lnTo>
-                  <a:pt x="5931830" y="757813"/>
-                </a:lnTo>
-                <a:lnTo>
-                  <a:pt x="5949815" y="923777"/>
-                </a:lnTo>
-                <a:lnTo>
-                  <a:pt x="5967801" y="1104142"/>
-                </a:lnTo>
-                <a:lnTo>
-                  <a:pt x="5986122" y="1296166"/>
-                </a:lnTo>
-                <a:lnTo>
-                  <a:pt x="6003099" y="1503278"/>
-                </a:lnTo>
-                <a:lnTo>
-                  <a:pt x="6019404" y="1719991"/>
-                </a:lnTo>
-                <a:lnTo>
-                  <a:pt x="6034196" y="1949048"/>
-                </a:lnTo>
-                <a:lnTo>
-                  <a:pt x="6048315" y="2187706"/>
-                </a:lnTo>
-                <a:lnTo>
-                  <a:pt x="6061595" y="2436652"/>
-                </a:lnTo>
-                <a:lnTo>
-                  <a:pt x="6066301" y="2564211"/>
-                </a:lnTo>
-                <a:lnTo>
-                  <a:pt x="6071512" y="2694512"/>
-                </a:lnTo>
-                <a:lnTo>
-                  <a:pt x="6076386" y="2826871"/>
-                </a:lnTo>
-                <a:lnTo>
-                  <a:pt x="6079580" y="2959917"/>
-                </a:lnTo>
-                <a:lnTo>
-                  <a:pt x="6082438" y="3095705"/>
-                </a:lnTo>
-                <a:lnTo>
-                  <a:pt x="6085463" y="3232865"/>
-                </a:lnTo>
-                <a:lnTo>
-                  <a:pt x="6087480" y="3372768"/>
-                </a:lnTo>
-                <a:lnTo>
-                  <a:pt x="6087480" y="3514043"/>
-                </a:lnTo>
-                <a:lnTo>
-                  <a:pt x="6088489" y="3656689"/>
-                </a:lnTo>
-                <a:lnTo>
-                  <a:pt x="6087480" y="3800707"/>
-                </a:lnTo>
-                <a:lnTo>
-                  <a:pt x="6085463" y="3946783"/>
-                </a:lnTo>
-                <a:lnTo>
-                  <a:pt x="6083614" y="4092858"/>
-                </a:lnTo>
-                <a:lnTo>
-                  <a:pt x="6079580" y="4240991"/>
-                </a:lnTo>
-                <a:lnTo>
-                  <a:pt x="6075378" y="4390495"/>
-                </a:lnTo>
-                <a:lnTo>
-                  <a:pt x="6070503" y="4540000"/>
-                </a:lnTo>
-                <a:lnTo>
-                  <a:pt x="6063612" y="4690876"/>
-                </a:lnTo>
-                <a:lnTo>
-                  <a:pt x="6055375" y="4843123"/>
-                </a:lnTo>
-                <a:lnTo>
-                  <a:pt x="6047475" y="4996057"/>
-                </a:lnTo>
-                <a:lnTo>
-                  <a:pt x="6037390" y="5148990"/>
-                </a:lnTo>
-                <a:lnTo>
-                  <a:pt x="6025287" y="5303981"/>
-                </a:lnTo>
-                <a:lnTo>
-                  <a:pt x="6013185" y="5456914"/>
-                </a:lnTo>
-                <a:lnTo>
-                  <a:pt x="5999233" y="5612591"/>
-                </a:lnTo>
-                <a:lnTo>
-                  <a:pt x="5983937" y="5768953"/>
-                </a:lnTo>
-                <a:lnTo>
-                  <a:pt x="5967801" y="5923258"/>
-                </a:lnTo>
-                <a:lnTo>
-                  <a:pt x="5948975" y="6079621"/>
-                </a:lnTo>
-                <a:lnTo>
-                  <a:pt x="5928804" y="6235297"/>
-                </a:lnTo>
-                <a:lnTo>
-                  <a:pt x="5908801" y="6391660"/>
-                </a:lnTo>
-                <a:lnTo>
-                  <a:pt x="5885437" y="6547336"/>
-                </a:lnTo>
-                <a:lnTo>
-                  <a:pt x="5861568" y="6702327"/>
-                </a:lnTo>
-                <a:lnTo>
-                  <a:pt x="5836524" y="6858002"/>
-                </a:lnTo>
-                <a:lnTo>
-                  <a:pt x="3563332" y="6858002"/>
-                </a:lnTo>
-                <a:lnTo>
-                  <a:pt x="1223490" y="6858002"/>
-                </a:lnTo>
-                <a:lnTo>
-                  <a:pt x="0" y="6858002"/>
-                </a:lnTo>
-                <a:close/>
-              </a:path>
-            </a:pathLst>
-          </a:custGeom>
-          <a:ln>
-            <a:noFill/>
-          </a:ln>
-          <a:effectLst>
-            <a:outerShdw blurRad="50800" dist="38100" algn="l" rotWithShape="0">
-              <a:prstClr val="black">
-                <a:alpha val="40000"/>
-              </a:prstClr>
-            </a:outerShdw>
-          </a:effectLst>
-        </p:spPr>
-        <p:style>
-          <a:lnRef idx="2">
-            <a:schemeClr val="accent1">
-              <a:shade val="50000"/>
-            </a:schemeClr>
-          </a:lnRef>
-          <a:fillRef idx="1">
-            <a:schemeClr val="accent1"/>
-          </a:fillRef>
-          <a:effectRef idx="0">
-            <a:schemeClr val="accent1"/>
-          </a:effectRef>
-          <a:fontRef idx="minor">
-            <a:schemeClr val="lt1"/>
-          </a:fontRef>
-        </p:style>
-        <p:txBody>
-          <a:bodyPr rtlCol="0" anchor="ctr"/>
-          <a:lstStyle/>
-          <a:p>
-            <a:pPr algn="ctr"/>
+            <a:spLocks noGrp="1"/>
+          </p:cNvSpPr>
+          <p:nvPr>
+            <p:ph type="title"/>
+          </p:nvPr>
+        </p:nvSpPr>
+        <p:spPr/>
+        <p:txBody>
+          <a:bodyPr/>
+          <a:lstStyle/>
+          <a:p>
             <a:endParaRPr lang="en-US"/>
           </a:p>
         </p:txBody>
       </p:sp>
-      <p:sp>
-        <p:nvSpPr>
-          <p:cNvPr id="2" name="Tittel 1">
+      <p:pic>
+        <p:nvPicPr>
+          <p:cNvPr id="5" name="Plassholder for innhold 4">
             <a:extLst>
               <a:ext uri="{FF2B5EF4-FFF2-40B4-BE49-F238E27FC236}">
-                <a16:creationId xmlns:a16="http://schemas.microsoft.com/office/drawing/2014/main" id="{BE312932-1E04-B11B-0CAE-3532A1A66978}"/>
+                <a16:creationId xmlns:a16="http://schemas.microsoft.com/office/drawing/2014/main" id="{A1B35CB9-D99C-4EB1-8C04-4664112AC0CD}"/>
               </a:ext>
             </a:extLst>
           </p:cNvPr>
-          <p:cNvSpPr>
-            <a:spLocks noGrp="1"/>
-          </p:cNvSpPr>
-          <p:nvPr>
-            <p:ph type="ctrTitle"/>
-          </p:nvPr>
-        </p:nvSpPr>
-        <p:spPr>
-          <a:xfrm>
-            <a:off x="913795" y="1257301"/>
-            <a:ext cx="6672865" cy="4343399"/>
-          </a:xfrm>
-        </p:spPr>
-        <p:txBody>
-          <a:bodyPr anchor="ctr">
-            <a:normAutofit/>
-          </a:bodyPr>
-          <a:lstStyle/>
-          <a:p>
-            <a:endParaRPr lang="en-US" sz="2400" dirty="0"/>
-          </a:p>
-        </p:txBody>
-      </p:sp>
+          <p:cNvPicPr>
+            <a:picLocks noGrp="1" noChangeAspect="1"/>
+          </p:cNvPicPr>
+          <p:nvPr>
+            <p:ph idx="1"/>
+          </p:nvPr>
+        </p:nvPicPr>
+        <p:blipFill>
+          <a:blip r:embed="rId2"/>
+          <a:stretch>
+            <a:fillRect/>
+          </a:stretch>
+        </p:blipFill>
+        <p:spPr>
+          <a:xfrm>
+            <a:off x="913882" y="5478552"/>
+            <a:ext cx="10353675" cy="769848"/>
+          </a:xfrm>
+        </p:spPr>
+      </p:pic>
+      <p:pic>
+        <p:nvPicPr>
+          <p:cNvPr id="7" name="Bilde 6">
+            <a:extLst>
+              <a:ext uri="{FF2B5EF4-FFF2-40B4-BE49-F238E27FC236}">
+                <a16:creationId xmlns:a16="http://schemas.microsoft.com/office/drawing/2014/main" id="{609D3A6B-1033-561A-98A7-B3A4705C938E}"/>
+              </a:ext>
+            </a:extLst>
+          </p:cNvPr>
+          <p:cNvPicPr>
+            <a:picLocks noChangeAspect="1"/>
+          </p:cNvPicPr>
+          <p:nvPr/>
+        </p:nvPicPr>
+        <p:blipFill>
+          <a:blip r:embed="rId3"/>
+          <a:stretch>
+            <a:fillRect/>
+          </a:stretch>
+        </p:blipFill>
+        <p:spPr>
+          <a:xfrm>
+            <a:off x="2146775" y="2167093"/>
+            <a:ext cx="7887801" cy="1905266"/>
+          </a:xfrm>
+          <a:prstGeom prst="rect">
+            <a:avLst/>
+          </a:prstGeom>
+        </p:spPr>
+      </p:pic>
+      <p:pic>
+        <p:nvPicPr>
+          <p:cNvPr id="9" name="Bilde 8">
+            <a:extLst>
+              <a:ext uri="{FF2B5EF4-FFF2-40B4-BE49-F238E27FC236}">
+                <a16:creationId xmlns:a16="http://schemas.microsoft.com/office/drawing/2014/main" id="{10F0A3D1-1A65-AE06-0E29-C7C94B262A9C}"/>
+              </a:ext>
+            </a:extLst>
+          </p:cNvPr>
+          <p:cNvPicPr>
+            <a:picLocks noChangeAspect="1"/>
+          </p:cNvPicPr>
+          <p:nvPr/>
+        </p:nvPicPr>
+        <p:blipFill>
+          <a:blip r:embed="rId4"/>
+          <a:stretch>
+            <a:fillRect/>
+          </a:stretch>
+        </p:blipFill>
+        <p:spPr>
+          <a:xfrm>
+            <a:off x="2423000" y="4268822"/>
+            <a:ext cx="6820852" cy="390580"/>
+          </a:xfrm>
+          <a:prstGeom prst="rect">
+            <a:avLst/>
+          </a:prstGeom>
+        </p:spPr>
+      </p:pic>
     </p:spTree>
     <p:extLst>
       <p:ext uri="{BB962C8B-B14F-4D97-AF65-F5344CB8AC3E}">
-        <p14:creationId xmlns:p14="http://schemas.microsoft.com/office/powerpoint/2010/main" val="272932330"/>
+        <p14:creationId xmlns:p14="http://schemas.microsoft.com/office/powerpoint/2010/main" val="2854018891"/>
       </p:ext>
     </p:extLst>
   </p:cSld>
@@ -6812,211 +8207,147 @@
           <a:chExt cx="0" cy="0"/>
         </a:xfrm>
       </p:grpSpPr>
-      <p:sp useBgFill="1">
-        <p:nvSpPr>
-          <p:cNvPr id="15" name="Rectangle 14">
+      <p:sp>
+        <p:nvSpPr>
+          <p:cNvPr id="2" name="Tittel 1">
             <a:extLst>
               <a:ext uri="{FF2B5EF4-FFF2-40B4-BE49-F238E27FC236}">
-                <a16:creationId xmlns:a16="http://schemas.microsoft.com/office/drawing/2014/main" id="{769960A3-4EE1-43D2-ABFC-C7A03ED21489}"/>
-              </a:ext>
-              <a:ext uri="{C183D7F6-B498-43B3-948B-1728B52AA6E4}">
-                <adec:decorative xmlns:adec="http://schemas.microsoft.com/office/drawing/2017/decorative" val="1"/>
+                <a16:creationId xmlns:a16="http://schemas.microsoft.com/office/drawing/2014/main" id="{97D8F671-A65B-B747-AF07-6F50582D542F}"/>
               </a:ext>
             </a:extLst>
           </p:cNvPr>
           <p:cNvSpPr>
-            <a:spLocks noGrp="1" noRot="1" noChangeAspect="1" noMove="1" noResize="1" noEditPoints="1" noAdjustHandles="1" noChangeArrowheads="1" noChangeShapeType="1" noTextEdit="1"/>
-          </p:cNvSpPr>
-          <p:nvPr>
-            <p:extLst>
-              <p:ext uri="{386F3935-93C4-4BCD-93E2-E3B085C9AB24}">
-                <p16:designElem xmlns:p16="http://schemas.microsoft.com/office/powerpoint/2015/main" val="1"/>
-              </p:ext>
-            </p:extLst>
-          </p:nvPr>
-        </p:nvSpPr>
-        <p:spPr>
-          <a:xfrm>
-            <a:off x="0" y="0"/>
-            <a:ext cx="12192000" cy="6858000"/>
+            <a:spLocks noGrp="1"/>
+          </p:cNvSpPr>
+          <p:nvPr>
+            <p:ph type="title"/>
+          </p:nvPr>
+        </p:nvSpPr>
+        <p:spPr>
+          <a:xfrm>
+            <a:off x="1370693" y="4406537"/>
+            <a:ext cx="9440034" cy="1088336"/>
+          </a:xfrm>
+        </p:spPr>
+        <p:txBody>
+          <a:bodyPr vert="horz" lIns="91440" tIns="45720" rIns="91440" bIns="45720" rtlCol="0" anchor="b">
+            <a:normAutofit/>
+          </a:bodyPr>
+          <a:lstStyle/>
+          <a:p>
+            <a:r>
+              <a:rPr lang="en-US" sz="4800"/>
+              <a:t>Tabeller	</a:t>
+            </a:r>
+          </a:p>
+        </p:txBody>
+      </p:sp>
+      <p:sp>
+        <p:nvSpPr>
+          <p:cNvPr id="3" name="Plassholder for innhold 2">
+            <a:extLst>
+              <a:ext uri="{FF2B5EF4-FFF2-40B4-BE49-F238E27FC236}">
+                <a16:creationId xmlns:a16="http://schemas.microsoft.com/office/drawing/2014/main" id="{6BFBBED4-44B1-9296-479E-C1115D3B360B}"/>
+              </a:ext>
+            </a:extLst>
+          </p:cNvPr>
+          <p:cNvSpPr>
+            <a:spLocks noGrp="1"/>
+          </p:cNvSpPr>
+          <p:nvPr>
+            <p:ph idx="1"/>
+          </p:nvPr>
+        </p:nvSpPr>
+        <p:spPr>
+          <a:xfrm>
+            <a:off x="1370693" y="5494872"/>
+            <a:ext cx="9440034" cy="621614"/>
+          </a:xfrm>
+        </p:spPr>
+        <p:txBody>
+          <a:bodyPr vert="horz" lIns="91440" tIns="45720" rIns="91440" bIns="45720" rtlCol="0" anchor="t">
+            <a:normAutofit/>
+          </a:bodyPr>
+          <a:lstStyle/>
+          <a:p>
+            <a:pPr marL="0" indent="0" algn="ctr">
+              <a:buNone/>
+            </a:pPr>
+            <a:r>
+              <a:rPr lang="en-US">
+                <a:solidFill>
+                  <a:srgbClr val="95D358"/>
+                </a:solidFill>
+              </a:rPr>
+              <a:t>Startup kjører migrering</a:t>
+            </a:r>
+          </a:p>
+        </p:txBody>
+      </p:sp>
+      <p:pic>
+        <p:nvPicPr>
+          <p:cNvPr id="5" name="Bilde 4" descr="Et bilde som inneholder tekst, skjermbilde, innendørs, lukk&#10;&#10;Automatisk generert beskrivelse">
+            <a:extLst>
+              <a:ext uri="{FF2B5EF4-FFF2-40B4-BE49-F238E27FC236}">
+                <a16:creationId xmlns:a16="http://schemas.microsoft.com/office/drawing/2014/main" id="{4C914057-F866-85CD-779A-5E74556D5D4A}"/>
+              </a:ext>
+            </a:extLst>
+          </p:cNvPr>
+          <p:cNvPicPr>
+            <a:picLocks noChangeAspect="1"/>
+          </p:cNvPicPr>
+          <p:nvPr/>
+        </p:nvPicPr>
+        <p:blipFill>
+          <a:blip r:embed="rId3"/>
+          <a:stretch>
+            <a:fillRect/>
+          </a:stretch>
+        </p:blipFill>
+        <p:spPr>
+          <a:xfrm>
+            <a:off x="1766655" y="643463"/>
+            <a:ext cx="8665477" cy="3249553"/>
           </a:xfrm>
           <a:prstGeom prst="rect">
             <a:avLst/>
           </a:prstGeom>
-          <a:ln>
-            <a:noFill/>
-          </a:ln>
-        </p:spPr>
-        <p:style>
-          <a:lnRef idx="2">
-            <a:schemeClr val="accent1">
-              <a:shade val="50000"/>
-            </a:schemeClr>
-          </a:lnRef>
-          <a:fillRef idx="1">
-            <a:schemeClr val="accent1"/>
-          </a:fillRef>
-          <a:effectRef idx="0">
-            <a:schemeClr val="accent1"/>
-          </a:effectRef>
-          <a:fontRef idx="minor">
-            <a:schemeClr val="lt1"/>
-          </a:fontRef>
-        </p:style>
-        <p:txBody>
-          <a:bodyPr rtlCol="0" anchor="ctr"/>
-          <a:lstStyle/>
-          <a:p>
-            <a:pPr algn="ctr"/>
-            <a:endParaRPr lang="en-US"/>
-          </a:p>
-        </p:txBody>
-      </p:sp>
-      <p:sp>
-        <p:nvSpPr>
-          <p:cNvPr id="2" name="Tittel 1">
+        </p:spPr>
+      </p:pic>
+      <p:pic>
+        <p:nvPicPr>
+          <p:cNvPr id="7" name="Bilde 6">
             <a:extLst>
               <a:ext uri="{FF2B5EF4-FFF2-40B4-BE49-F238E27FC236}">
-                <a16:creationId xmlns:a16="http://schemas.microsoft.com/office/drawing/2014/main" id="{1BA07730-02EE-93B0-64EF-F287BD770121}"/>
+                <a16:creationId xmlns:a16="http://schemas.microsoft.com/office/drawing/2014/main" id="{0CAA8904-1E83-CDE0-6422-583CC0768DA9}"/>
               </a:ext>
             </a:extLst>
           </p:cNvPr>
-          <p:cNvSpPr>
-            <a:spLocks noGrp="1"/>
-          </p:cNvSpPr>
-          <p:nvPr>
-            <p:ph type="title"/>
-          </p:nvPr>
-        </p:nvSpPr>
-        <p:spPr>
-          <a:xfrm>
-            <a:off x="913795" y="609600"/>
-            <a:ext cx="10353762" cy="1164772"/>
-          </a:xfrm>
-        </p:spPr>
-        <p:txBody>
-          <a:bodyPr>
-            <a:normAutofit/>
-          </a:bodyPr>
-          <a:lstStyle/>
-          <a:p>
-            <a:r>
-              <a:rPr lang="nb-NO" dirty="0"/>
-              <a:t>Krav</a:t>
-            </a:r>
-            <a:endParaRPr lang="en-US" dirty="0"/>
-          </a:p>
-        </p:txBody>
-      </p:sp>
-      <p:pic>
-        <p:nvPicPr>
-          <p:cNvPr id="17" name="Picture 16">
-            <a:extLst>
-              <a:ext uri="{FF2B5EF4-FFF2-40B4-BE49-F238E27FC236}">
-                <a16:creationId xmlns:a16="http://schemas.microsoft.com/office/drawing/2014/main" id="{16ABCF9F-46A6-4370-8EC8-B1EDB4510B54}"/>
-              </a:ext>
-              <a:ext uri="{C183D7F6-B498-43B3-948B-1728B52AA6E4}">
-                <adec:decorative xmlns:adec="http://schemas.microsoft.com/office/drawing/2017/decorative" val="1"/>
-              </a:ext>
-            </a:extLst>
-          </p:cNvPr>
-          <p:cNvPicPr preferRelativeResize="0">
-            <a:picLocks noGrp="1" noRot="1" noChangeAspect="1" noMove="1" noResize="1" noEditPoints="1" noAdjustHandles="1" noChangeArrowheads="1" noChangeShapeType="1" noCrop="1"/>
+          <p:cNvPicPr>
+            <a:picLocks noChangeAspect="1"/>
           </p:cNvPicPr>
-          <p:nvPr>
-            <p:extLst>
-              <p:ext uri="{386F3935-93C4-4BCD-93E2-E3B085C9AB24}">
-                <p16:designElem xmlns:p16="http://schemas.microsoft.com/office/powerpoint/2015/main" val="1"/>
-              </p:ext>
-            </p:extLst>
-          </p:nvPr>
+          <p:nvPr/>
         </p:nvPicPr>
-        <p:blipFill rotWithShape="1">
-          <a:blip r:embed="rId3">
-            <a:extLst>
-              <a:ext uri="{28A0092B-C50C-407E-A947-70E740481C1C}">
-                <a14:useLocalDpi xmlns:a14="http://schemas.microsoft.com/office/drawing/2010/main" val="0"/>
-              </a:ext>
-            </a:extLst>
-          </a:blip>
-          <a:srcRect l="798" t="2669" r="616"/>
-          <a:stretch/>
+        <p:blipFill>
+          <a:blip r:embed="rId4"/>
+          <a:stretch>
+            <a:fillRect/>
+          </a:stretch>
         </p:blipFill>
         <p:spPr>
           <a:xfrm>
-            <a:off x="-1" y="2046514"/>
-            <a:ext cx="12192001" cy="4811485"/>
+            <a:off x="5846945" y="6006934"/>
+            <a:ext cx="504895" cy="219106"/>
           </a:xfrm>
           <a:prstGeom prst="rect">
             <a:avLst/>
           </a:prstGeom>
-          <a:effectLst>
-            <a:innerShdw blurRad="63500" dist="50800" dir="16200000">
-              <a:prstClr val="black">
-                <a:alpha val="50000"/>
-              </a:prstClr>
-            </a:innerShdw>
-          </a:effectLst>
         </p:spPr>
       </p:pic>
-      <p:sp>
-        <p:nvSpPr>
-          <p:cNvPr id="3" name="Plassholder for innhold 2">
-            <a:extLst>
-              <a:ext uri="{FF2B5EF4-FFF2-40B4-BE49-F238E27FC236}">
-                <a16:creationId xmlns:a16="http://schemas.microsoft.com/office/drawing/2014/main" id="{BB0866E6-7FE6-C2BF-6C25-1978C6F3F302}"/>
-              </a:ext>
-            </a:extLst>
-          </p:cNvPr>
-          <p:cNvSpPr>
-            <a:spLocks noGrp="1"/>
-          </p:cNvSpPr>
-          <p:nvPr>
-            <p:ph idx="1"/>
-          </p:nvPr>
-        </p:nvSpPr>
-        <p:spPr>
-          <a:xfrm>
-            <a:off x="1235528" y="2481943"/>
-            <a:ext cx="9710296" cy="3309258"/>
-          </a:xfrm>
-        </p:spPr>
-        <p:txBody>
-          <a:bodyPr>
-            <a:normAutofit/>
-          </a:bodyPr>
-          <a:lstStyle/>
-          <a:p>
-            <a:r>
-              <a:rPr lang="nb-NO" dirty="0"/>
-              <a:t>Windows, Linux, MacOS</a:t>
-            </a:r>
-          </a:p>
-          <a:p>
-            <a:r>
-              <a:rPr lang="nb-NO" dirty="0" err="1"/>
-              <a:t>Docker</a:t>
-            </a:r>
-            <a:r>
-              <a:rPr lang="nb-NO" dirty="0"/>
-              <a:t> API kompatibel konteiner «</a:t>
-            </a:r>
-            <a:r>
-              <a:rPr lang="nb-NO" dirty="0" err="1"/>
-              <a:t>runtime</a:t>
-            </a:r>
-            <a:r>
-              <a:rPr lang="nb-NO" dirty="0"/>
-              <a:t>»</a:t>
-            </a:r>
-            <a:endParaRPr lang="en-US" dirty="0"/>
-          </a:p>
-        </p:txBody>
-      </p:sp>
     </p:spTree>
     <p:extLst>
       <p:ext uri="{BB962C8B-B14F-4D97-AF65-F5344CB8AC3E}">
-        <p14:creationId xmlns:p14="http://schemas.microsoft.com/office/powerpoint/2010/main" val="3364482460"/>
+        <p14:creationId xmlns:p14="http://schemas.microsoft.com/office/powerpoint/2010/main" val="3557182290"/>
       </p:ext>
     </p:extLst>
   </p:cSld>
@@ -7029,6 +8360,14 @@
 <file path=ppt/slides/slide4.xml><?xml version="1.0" encoding="utf-8"?>
 <p:sld xmlns:a="http://schemas.openxmlformats.org/drawingml/2006/main" xmlns:r="http://schemas.openxmlformats.org/officeDocument/2006/relationships" xmlns:p="http://schemas.openxmlformats.org/presentationml/2006/main">
   <p:cSld>
+    <p:bg>
+      <p:bgPr>
+        <a:solidFill>
+          <a:schemeClr val="bg1"/>
+        </a:solidFill>
+        <a:effectLst/>
+      </p:bgPr>
+    </p:bg>
     <p:spTree>
       <p:nvGrpSpPr>
         <p:cNvPr id="1" name=""/>
@@ -7045,10 +8384,70 @@
       </p:grpSpPr>
       <p:sp>
         <p:nvSpPr>
+          <p:cNvPr id="14" name="Rectangle 13">
+            <a:extLst>
+              <a:ext uri="{FF2B5EF4-FFF2-40B4-BE49-F238E27FC236}">
+                <a16:creationId xmlns:a16="http://schemas.microsoft.com/office/drawing/2014/main" id="{95CB840F-8E41-4CA5-B79B-25CC80AD234A}"/>
+              </a:ext>
+              <a:ext uri="{C183D7F6-B498-43B3-948B-1728B52AA6E4}">
+                <adec:decorative xmlns:adec="http://schemas.microsoft.com/office/drawing/2017/decorative" val="1"/>
+              </a:ext>
+            </a:extLst>
+          </p:cNvPr>
+          <p:cNvSpPr>
+            <a:spLocks noGrp="1" noRot="1" noChangeAspect="1" noMove="1" noResize="1" noEditPoints="1" noAdjustHandles="1" noChangeArrowheads="1" noChangeShapeType="1" noTextEdit="1"/>
+          </p:cNvSpPr>
+          <p:nvPr>
+            <p:extLst>
+              <p:ext uri="{386F3935-93C4-4BCD-93E2-E3B085C9AB24}">
+                <p16:designElem xmlns:p16="http://schemas.microsoft.com/office/powerpoint/2015/main" val="1"/>
+              </p:ext>
+            </p:extLst>
+          </p:nvPr>
+        </p:nvSpPr>
+        <p:spPr>
+          <a:xfrm>
+            <a:off x="0" y="0"/>
+            <a:ext cx="12192000" cy="6858000"/>
+          </a:xfrm>
+          <a:prstGeom prst="rect">
+            <a:avLst/>
+          </a:prstGeom>
+          <a:ln>
+            <a:noFill/>
+          </a:ln>
+        </p:spPr>
+        <p:style>
+          <a:lnRef idx="2">
+            <a:schemeClr val="accent1">
+              <a:shade val="50000"/>
+            </a:schemeClr>
+          </a:lnRef>
+          <a:fillRef idx="1003">
+            <a:schemeClr val="dk2"/>
+          </a:fillRef>
+          <a:effectRef idx="0">
+            <a:schemeClr val="accent1"/>
+          </a:effectRef>
+          <a:fontRef idx="minor">
+            <a:schemeClr val="lt1"/>
+          </a:fontRef>
+        </p:style>
+        <p:txBody>
+          <a:bodyPr rtlCol="0" anchor="ctr"/>
+          <a:lstStyle/>
+          <a:p>
+            <a:pPr algn="ctr"/>
+            <a:endParaRPr lang="en-US"/>
+          </a:p>
+        </p:txBody>
+      </p:sp>
+      <p:sp>
+        <p:nvSpPr>
           <p:cNvPr id="2" name="Tittel 1">
             <a:extLst>
               <a:ext uri="{FF2B5EF4-FFF2-40B4-BE49-F238E27FC236}">
-                <a16:creationId xmlns:a16="http://schemas.microsoft.com/office/drawing/2014/main" id="{58A24ED1-C5E0-5C5E-7FD3-33C3749468FB}"/>
+                <a16:creationId xmlns:a16="http://schemas.microsoft.com/office/drawing/2014/main" id="{C898A47D-8F10-0B23-C464-854B41D7D28D}"/>
               </a:ext>
             </a:extLst>
           </p:cNvPr>
@@ -7059,25 +8458,55 @@
             <p:ph type="title"/>
           </p:nvPr>
         </p:nvSpPr>
-        <p:spPr/>
-        <p:txBody>
-          <a:bodyPr/>
-          <a:lstStyle/>
-          <a:p>
-            <a:r>
-              <a:rPr lang="nb-NO" dirty="0" err="1"/>
-              <a:t>WebApplicationFactory</a:t>
-            </a:r>
-            <a:endParaRPr lang="en-US" dirty="0"/>
-          </a:p>
-        </p:txBody>
-      </p:sp>
-      <p:sp>
-        <p:nvSpPr>
-          <p:cNvPr id="3" name="Plassholder for innhold 2">
+        <p:spPr>
+          <a:xfrm>
+            <a:off x="913795" y="609600"/>
+            <a:ext cx="3078749" cy="970450"/>
+          </a:xfrm>
+        </p:spPr>
+        <p:txBody>
+          <a:bodyPr anchor="b">
+            <a:normAutofit/>
+          </a:bodyPr>
+          <a:lstStyle/>
+          <a:p>
+            <a:pPr algn="l"/>
+            <a:r>
+              <a:rPr lang="nb-NO" sz="2800">
+                <a:ln>
+                  <a:solidFill>
+                    <a:srgbClr val="404040">
+                      <a:alpha val="10000"/>
+                    </a:srgbClr>
+                  </a:solidFill>
+                </a:ln>
+                <a:solidFill>
+                  <a:srgbClr val="DADADA"/>
+                </a:solidFill>
+              </a:rPr>
+              <a:t>Swagger</a:t>
+            </a:r>
+            <a:endParaRPr lang="en-US" sz="2800">
+              <a:ln>
+                <a:solidFill>
+                  <a:srgbClr val="404040">
+                    <a:alpha val="10000"/>
+                  </a:srgbClr>
+                </a:solidFill>
+              </a:ln>
+              <a:solidFill>
+                <a:srgbClr val="DADADA"/>
+              </a:solidFill>
+            </a:endParaRPr>
+          </a:p>
+        </p:txBody>
+      </p:sp>
+      <p:sp>
+        <p:nvSpPr>
+          <p:cNvPr id="7" name="Plassholder for innhold 6">
             <a:extLst>
               <a:ext uri="{FF2B5EF4-FFF2-40B4-BE49-F238E27FC236}">
-                <a16:creationId xmlns:a16="http://schemas.microsoft.com/office/drawing/2014/main" id="{13774890-8428-C14E-7A76-9434B0ED8749}"/>
+                <a16:creationId xmlns:a16="http://schemas.microsoft.com/office/drawing/2014/main" id="{2D4A9F54-47E0-3403-8381-2DFAFE8E0B3C}"/>
               </a:ext>
             </a:extLst>
           </p:cNvPr>
@@ -7088,129 +8517,72 @@
             <p:ph idx="1"/>
           </p:nvPr>
         </p:nvSpPr>
-        <p:spPr/>
-        <p:txBody>
-          <a:bodyPr/>
-          <a:lstStyle/>
-          <a:p>
-            <a:r>
-              <a:rPr lang="nb-NO" dirty="0" err="1"/>
-              <a:t>Nugets</a:t>
-            </a:r>
-            <a:endParaRPr lang="nb-NO" dirty="0"/>
-          </a:p>
-          <a:p>
-            <a:pPr lvl="1"/>
-            <a:r>
-              <a:rPr lang="nb-NO" dirty="0" err="1"/>
-              <a:t>Microsoft.AspNetCore.Mvc.Testing</a:t>
-            </a:r>
-            <a:endParaRPr lang="nb-NO" dirty="0"/>
-          </a:p>
-          <a:p>
-            <a:r>
-              <a:rPr lang="nb-NO" dirty="0" err="1"/>
-              <a:t>Mentions</a:t>
-            </a:r>
-            <a:endParaRPr lang="nb-NO" dirty="0"/>
-          </a:p>
-          <a:p>
-            <a:pPr lvl="1"/>
-            <a:r>
-              <a:rPr lang="nb-NO" dirty="0" err="1"/>
-              <a:t>FluentAssertion</a:t>
-            </a:r>
-            <a:r>
-              <a:rPr lang="nb-NO" dirty="0"/>
-              <a:t> ( </a:t>
-            </a:r>
-            <a:r>
-              <a:rPr lang="nb-NO" dirty="0" err="1"/>
-              <a:t>Fluent</a:t>
-            </a:r>
-            <a:r>
-              <a:rPr lang="nb-NO" dirty="0"/>
-              <a:t> </a:t>
-            </a:r>
-            <a:r>
-              <a:rPr lang="nb-NO" dirty="0" err="1"/>
-              <a:t>syntax</a:t>
-            </a:r>
-            <a:r>
-              <a:rPr lang="nb-NO" dirty="0"/>
-              <a:t> -&gt; </a:t>
-            </a:r>
-            <a:r>
-              <a:rPr lang="nb-NO" dirty="0" err="1"/>
-              <a:t>customer.should.be.x</a:t>
-            </a:r>
-            <a:endParaRPr lang="nb-NO" dirty="0"/>
-          </a:p>
-          <a:p>
-            <a:pPr lvl="1"/>
-            <a:r>
-              <a:rPr lang="nb-NO" dirty="0" err="1"/>
-              <a:t>Bogus</a:t>
-            </a:r>
-            <a:r>
-              <a:rPr lang="nb-NO" dirty="0"/>
-              <a:t> ( </a:t>
-            </a:r>
-            <a:r>
-              <a:rPr lang="nb-NO" dirty="0" err="1"/>
-              <a:t>new</a:t>
-            </a:r>
-            <a:r>
-              <a:rPr lang="nb-NO" dirty="0"/>
-              <a:t> </a:t>
-            </a:r>
-            <a:r>
-              <a:rPr lang="nb-NO" dirty="0" err="1"/>
-              <a:t>customer</a:t>
-            </a:r>
-            <a:r>
-              <a:rPr lang="nb-NO" dirty="0"/>
-              <a:t> -&gt; </a:t>
-            </a:r>
-            <a:r>
-              <a:rPr lang="nb-NO" dirty="0" err="1"/>
-              <a:t>random.firstname,lastname</a:t>
-            </a:r>
-            <a:r>
-              <a:rPr lang="nb-NO" dirty="0"/>
-              <a:t>-&gt; </a:t>
-            </a:r>
-            <a:r>
-              <a:rPr lang="nb-NO" dirty="0" err="1"/>
-              <a:t>generate</a:t>
-            </a:r>
-            <a:r>
-              <a:rPr lang="nb-NO" dirty="0"/>
-              <a:t> ( 10 ) </a:t>
-            </a:r>
-            <a:r>
-              <a:rPr lang="nb-NO" dirty="0" err="1"/>
-              <a:t>returns</a:t>
-            </a:r>
-            <a:r>
-              <a:rPr lang="nb-NO" dirty="0"/>
-              <a:t> a list or 1.</a:t>
-            </a:r>
-          </a:p>
-          <a:p>
-            <a:endParaRPr lang="en-US" dirty="0"/>
-          </a:p>
-        </p:txBody>
-      </p:sp>
+        <p:spPr>
+          <a:xfrm>
+            <a:off x="913795" y="1732449"/>
+            <a:ext cx="3078749" cy="4482084"/>
+          </a:xfrm>
+        </p:spPr>
+        <p:txBody>
+          <a:bodyPr anchor="t">
+            <a:normAutofit/>
+          </a:bodyPr>
+          <a:lstStyle/>
+          <a:p>
+            <a:endParaRPr lang="en-US" sz="1600" dirty="0">
+              <a:ln>
+                <a:solidFill>
+                  <a:srgbClr val="404040">
+                    <a:alpha val="10000"/>
+                  </a:srgbClr>
+                </a:solidFill>
+              </a:ln>
+              <a:solidFill>
+                <a:srgbClr val="DADADA"/>
+              </a:solidFill>
+            </a:endParaRPr>
+          </a:p>
+        </p:txBody>
+      </p:sp>
+      <p:pic>
+        <p:nvPicPr>
+          <p:cNvPr id="9" name="Bilde 8">
+            <a:extLst>
+              <a:ext uri="{FF2B5EF4-FFF2-40B4-BE49-F238E27FC236}">
+                <a16:creationId xmlns:a16="http://schemas.microsoft.com/office/drawing/2014/main" id="{A631FFC9-1D0B-F3E5-62DC-7A99D2D25642}"/>
+              </a:ext>
+            </a:extLst>
+          </p:cNvPr>
+          <p:cNvPicPr>
+            <a:picLocks noChangeAspect="1"/>
+          </p:cNvPicPr>
+          <p:nvPr/>
+        </p:nvPicPr>
+        <p:blipFill>
+          <a:blip r:embed="rId2"/>
+          <a:stretch>
+            <a:fillRect/>
+          </a:stretch>
+        </p:blipFill>
+        <p:spPr>
+          <a:xfrm>
+            <a:off x="5776166" y="643466"/>
+            <a:ext cx="4902538" cy="5571067"/>
+          </a:xfrm>
+          <a:prstGeom prst="rect">
+            <a:avLst/>
+          </a:prstGeom>
+        </p:spPr>
+      </p:pic>
     </p:spTree>
     <p:extLst>
       <p:ext uri="{BB962C8B-B14F-4D97-AF65-F5344CB8AC3E}">
-        <p14:creationId xmlns:p14="http://schemas.microsoft.com/office/powerpoint/2010/main" val="143843206"/>
+        <p14:creationId xmlns:p14="http://schemas.microsoft.com/office/powerpoint/2010/main" val="1598471339"/>
       </p:ext>
     </p:extLst>
   </p:cSld>
   <p:clrMapOvr>
-    <a:masterClrMapping/>
+    <a:overrideClrMapping bg1="lt1" tx1="dk1" bg2="lt2" tx2="dk2" accent1="accent1" accent2="accent2" accent3="accent3" accent4="accent4" accent5="accent5" accent6="accent6" hlink="hlink" folHlink="folHlink"/>
   </p:clrMapOvr>
 </p:sld>
 </file>
@@ -7237,7 +8609,7 @@
           <p:cNvPr id="2" name="Tittel 1">
             <a:extLst>
               <a:ext uri="{FF2B5EF4-FFF2-40B4-BE49-F238E27FC236}">
-                <a16:creationId xmlns:a16="http://schemas.microsoft.com/office/drawing/2014/main" id="{EE717783-02E8-80D5-934C-BB0DC685291F}"/>
+                <a16:creationId xmlns:a16="http://schemas.microsoft.com/office/drawing/2014/main" id="{78737E8D-3084-BE3C-04A1-772EDA7C101F}"/>
               </a:ext>
             </a:extLst>
           </p:cNvPr>
@@ -7253,10 +8625,6 @@
           <a:bodyPr/>
           <a:lstStyle/>
           <a:p>
-            <a:r>
-              <a:rPr lang="nb-NO" dirty="0" err="1"/>
-              <a:t>Docker</a:t>
-            </a:r>
             <a:endParaRPr lang="en-US" dirty="0"/>
           </a:p>
         </p:txBody>
@@ -7266,7 +8634,7 @@
           <p:cNvPr id="3" name="Plassholder for innhold 2">
             <a:extLst>
               <a:ext uri="{FF2B5EF4-FFF2-40B4-BE49-F238E27FC236}">
-                <a16:creationId xmlns:a16="http://schemas.microsoft.com/office/drawing/2014/main" id="{8078BA4F-E0E8-458E-471D-B052F9D16D89}"/>
+                <a16:creationId xmlns:a16="http://schemas.microsoft.com/office/drawing/2014/main" id="{6726B1EC-5AF0-9D0C-8AE7-1F142EF9D8A2}"/>
               </a:ext>
             </a:extLst>
           </p:cNvPr>
@@ -7282,14 +8650,806 @@
           <a:bodyPr/>
           <a:lstStyle/>
           <a:p>
-            <a:endParaRPr lang="en-US" dirty="0"/>
+            <a:r>
+              <a:rPr lang="nb-NO" dirty="0"/>
+              <a:t>Klar for å kjøre testene</a:t>
+            </a:r>
+          </a:p>
+          <a:p>
+            <a:r>
+              <a:rPr lang="nb-NO" dirty="0"/>
+              <a:t>Men hvordan</a:t>
+            </a:r>
+            <a:r>
+              <a:rPr lang="en-US" dirty="0"/>
+              <a:t> </a:t>
+            </a:r>
+            <a:r>
+              <a:rPr lang="nb-NO" dirty="0"/>
+              <a:t>automatisere</a:t>
+            </a:r>
+            <a:r>
+              <a:rPr lang="en-US" dirty="0"/>
+              <a:t> det?</a:t>
+            </a:r>
           </a:p>
         </p:txBody>
       </p:sp>
     </p:spTree>
     <p:extLst>
       <p:ext uri="{BB962C8B-B14F-4D97-AF65-F5344CB8AC3E}">
-        <p14:creationId xmlns:p14="http://schemas.microsoft.com/office/powerpoint/2010/main" val="2526513038"/>
+        <p14:creationId xmlns:p14="http://schemas.microsoft.com/office/powerpoint/2010/main" val="1726391151"/>
+      </p:ext>
+    </p:extLst>
+  </p:cSld>
+  <p:clrMapOvr>
+    <a:masterClrMapping/>
+  </p:clrMapOvr>
+</p:sld>
+</file>
+
+<file path=ppt/slides/slide6.xml><?xml version="1.0" encoding="utf-8"?>
+<p:sld xmlns:a="http://schemas.openxmlformats.org/drawingml/2006/main" xmlns:r="http://schemas.openxmlformats.org/officeDocument/2006/relationships" xmlns:p="http://schemas.openxmlformats.org/presentationml/2006/main">
+  <p:cSld>
+    <p:bg>
+      <p:bgPr>
+        <a:blipFill rotWithShape="1">
+          <a:blip r:embed="rId3">
+            <a:duotone>
+              <a:schemeClr val="bg2">
+                <a:shade val="80000"/>
+                <a:lumMod val="80000"/>
+              </a:schemeClr>
+              <a:schemeClr val="bg2">
+                <a:tint val="98000"/>
+              </a:schemeClr>
+            </a:duotone>
+          </a:blip>
+          <a:stretch/>
+        </a:blipFill>
+        <a:effectLst/>
+      </p:bgPr>
+    </p:bg>
+    <p:spTree>
+      <p:nvGrpSpPr>
+        <p:cNvPr id="1" name=""/>
+        <p:cNvGrpSpPr/>
+        <p:nvPr/>
+      </p:nvGrpSpPr>
+      <p:grpSpPr>
+        <a:xfrm>
+          <a:off x="0" y="0"/>
+          <a:ext cx="0" cy="0"/>
+          <a:chOff x="0" y="0"/>
+          <a:chExt cx="0" cy="0"/>
+        </a:xfrm>
+      </p:grpSpPr>
+      <p:sp useBgFill="1">
+        <p:nvSpPr>
+          <p:cNvPr id="26" name="Rectangle 21">
+            <a:extLst>
+              <a:ext uri="{FF2B5EF4-FFF2-40B4-BE49-F238E27FC236}">
+                <a16:creationId xmlns:a16="http://schemas.microsoft.com/office/drawing/2014/main" id="{DAB482FD-C684-4DAA-AC4C-1739F51A98A0}"/>
+              </a:ext>
+              <a:ext uri="{C183D7F6-B498-43B3-948B-1728B52AA6E4}">
+                <adec:decorative xmlns:adec="http://schemas.microsoft.com/office/drawing/2017/decorative" val="1"/>
+              </a:ext>
+            </a:extLst>
+          </p:cNvPr>
+          <p:cNvSpPr>
+            <a:spLocks noGrp="1" noRot="1" noChangeAspect="1" noMove="1" noResize="1" noEditPoints="1" noAdjustHandles="1" noChangeArrowheads="1" noChangeShapeType="1" noTextEdit="1"/>
+          </p:cNvSpPr>
+          <p:nvPr>
+            <p:extLst>
+              <p:ext uri="{386F3935-93C4-4BCD-93E2-E3B085C9AB24}">
+                <p16:designElem xmlns:p16="http://schemas.microsoft.com/office/powerpoint/2015/main" val="1"/>
+              </p:ext>
+            </p:extLst>
+          </p:nvPr>
+        </p:nvSpPr>
+        <p:spPr>
+          <a:xfrm>
+            <a:off x="0" y="0"/>
+            <a:ext cx="12192000" cy="6858000"/>
+          </a:xfrm>
+          <a:prstGeom prst="rect">
+            <a:avLst/>
+          </a:prstGeom>
+          <a:ln>
+            <a:noFill/>
+          </a:ln>
+        </p:spPr>
+        <p:style>
+          <a:lnRef idx="2">
+            <a:schemeClr val="accent1">
+              <a:shade val="50000"/>
+            </a:schemeClr>
+          </a:lnRef>
+          <a:fillRef idx="1">
+            <a:schemeClr val="accent1"/>
+          </a:fillRef>
+          <a:effectRef idx="0">
+            <a:schemeClr val="accent1"/>
+          </a:effectRef>
+          <a:fontRef idx="minor">
+            <a:schemeClr val="lt1"/>
+          </a:fontRef>
+        </p:style>
+        <p:txBody>
+          <a:bodyPr rtlCol="0" anchor="ctr"/>
+          <a:lstStyle/>
+          <a:p>
+            <a:pPr algn="ctr"/>
+            <a:endParaRPr lang="en-US"/>
+          </a:p>
+        </p:txBody>
+      </p:sp>
+      <p:sp>
+        <p:nvSpPr>
+          <p:cNvPr id="2" name="Tittel 1">
+            <a:extLst>
+              <a:ext uri="{FF2B5EF4-FFF2-40B4-BE49-F238E27FC236}">
+                <a16:creationId xmlns:a16="http://schemas.microsoft.com/office/drawing/2014/main" id="{E6943094-3F9B-57A2-9149-A78D4F3E8AEE}"/>
+              </a:ext>
+            </a:extLst>
+          </p:cNvPr>
+          <p:cNvSpPr>
+            <a:spLocks noGrp="1"/>
+          </p:cNvSpPr>
+          <p:nvPr>
+            <p:ph type="ctrTitle"/>
+          </p:nvPr>
+        </p:nvSpPr>
+        <p:spPr>
+          <a:xfrm>
+            <a:off x="5139236" y="1097280"/>
+            <a:ext cx="6043875" cy="4626864"/>
+          </a:xfrm>
+        </p:spPr>
+        <p:txBody>
+          <a:bodyPr anchor="ctr">
+            <a:normAutofit/>
+          </a:bodyPr>
+          <a:lstStyle/>
+          <a:p>
+            <a:pPr algn="l"/>
+            <a:r>
+              <a:rPr lang="nb-NO" dirty="0"/>
+              <a:t>Testcontainers</a:t>
+            </a:r>
+            <a:endParaRPr lang="en-US" dirty="0"/>
+          </a:p>
+        </p:txBody>
+      </p:sp>
+      <p:sp>
+        <p:nvSpPr>
+          <p:cNvPr id="3" name="Undertittel 2">
+            <a:extLst>
+              <a:ext uri="{FF2B5EF4-FFF2-40B4-BE49-F238E27FC236}">
+                <a16:creationId xmlns:a16="http://schemas.microsoft.com/office/drawing/2014/main" id="{84A5A177-C0A8-9154-EA60-C5662A937858}"/>
+              </a:ext>
+            </a:extLst>
+          </p:cNvPr>
+          <p:cNvSpPr>
+            <a:spLocks noGrp="1"/>
+          </p:cNvSpPr>
+          <p:nvPr>
+            <p:ph type="subTitle" idx="1"/>
+          </p:nvPr>
+        </p:nvSpPr>
+        <p:spPr>
+          <a:xfrm>
+            <a:off x="-39017" y="1097280"/>
+            <a:ext cx="4451307" cy="4663440"/>
+          </a:xfrm>
+        </p:spPr>
+        <p:txBody>
+          <a:bodyPr anchor="ctr">
+            <a:normAutofit/>
+          </a:bodyPr>
+          <a:lstStyle/>
+          <a:p>
+            <a:pPr algn="r"/>
+            <a:r>
+              <a:rPr lang="en-US" dirty="0"/>
+              <a:t>https://dotnet.testcontainers.org/</a:t>
+            </a:r>
+          </a:p>
+        </p:txBody>
+      </p:sp>
+      <p:cxnSp>
+        <p:nvCxnSpPr>
+          <p:cNvPr id="27" name="Straight Connector 23">
+            <a:extLst>
+              <a:ext uri="{FF2B5EF4-FFF2-40B4-BE49-F238E27FC236}">
+                <a16:creationId xmlns:a16="http://schemas.microsoft.com/office/drawing/2014/main" id="{2DAA738B-EDF5-4694-B25A-3488245BC87C}"/>
+              </a:ext>
+              <a:ext uri="{C183D7F6-B498-43B3-948B-1728B52AA6E4}">
+                <adec:decorative xmlns:adec="http://schemas.microsoft.com/office/drawing/2017/decorative" val="1"/>
+              </a:ext>
+            </a:extLst>
+          </p:cNvPr>
+          <p:cNvCxnSpPr>
+            <a:cxnSpLocks noGrp="1" noRot="1" noChangeAspect="1" noMove="1" noResize="1" noEditPoints="1" noAdjustHandles="1" noChangeArrowheads="1" noChangeShapeType="1"/>
+          </p:cNvCxnSpPr>
+          <p:nvPr>
+            <p:extLst>
+              <p:ext uri="{386F3935-93C4-4BCD-93E2-E3B085C9AB24}">
+                <p16:designElem xmlns:p16="http://schemas.microsoft.com/office/powerpoint/2015/main" val="1"/>
+              </p:ext>
+            </p:extLst>
+          </p:nvPr>
+        </p:nvCxnSpPr>
+        <p:spPr>
+          <a:xfrm>
+            <a:off x="4654605" y="2057399"/>
+            <a:ext cx="0" cy="2743200"/>
+          </a:xfrm>
+          <a:prstGeom prst="line">
+            <a:avLst/>
+          </a:prstGeom>
+          <a:ln w="19050">
+            <a:solidFill>
+              <a:schemeClr val="tx2"/>
+            </a:solidFill>
+          </a:ln>
+        </p:spPr>
+        <p:style>
+          <a:lnRef idx="1">
+            <a:schemeClr val="accent1"/>
+          </a:lnRef>
+          <a:fillRef idx="0">
+            <a:schemeClr val="accent1"/>
+          </a:fillRef>
+          <a:effectRef idx="0">
+            <a:schemeClr val="accent1"/>
+          </a:effectRef>
+          <a:fontRef idx="minor">
+            <a:schemeClr val="tx1"/>
+          </a:fontRef>
+        </p:style>
+      </p:cxnSp>
+    </p:spTree>
+    <p:extLst>
+      <p:ext uri="{BB962C8B-B14F-4D97-AF65-F5344CB8AC3E}">
+        <p14:creationId xmlns:p14="http://schemas.microsoft.com/office/powerpoint/2010/main" val="1909991133"/>
+      </p:ext>
+    </p:extLst>
+  </p:cSld>
+  <p:clrMapOvr>
+    <a:masterClrMapping/>
+  </p:clrMapOvr>
+</p:sld>
+</file>
+
+<file path=ppt/slides/slide7.xml><?xml version="1.0" encoding="utf-8"?>
+<p:sld xmlns:a="http://schemas.openxmlformats.org/drawingml/2006/main" xmlns:r="http://schemas.openxmlformats.org/officeDocument/2006/relationships" xmlns:p="http://schemas.openxmlformats.org/presentationml/2006/main">
+  <p:cSld>
+    <p:bg>
+      <p:bgPr>
+        <a:blipFill rotWithShape="1">
+          <a:blip r:embed="rId2">
+            <a:duotone>
+              <a:schemeClr val="bg2">
+                <a:shade val="80000"/>
+                <a:lumMod val="80000"/>
+              </a:schemeClr>
+              <a:schemeClr val="bg2">
+                <a:tint val="98000"/>
+              </a:schemeClr>
+            </a:duotone>
+          </a:blip>
+          <a:stretch/>
+        </a:blipFill>
+        <a:effectLst/>
+      </p:bgPr>
+    </p:bg>
+    <p:spTree>
+      <p:nvGrpSpPr>
+        <p:cNvPr id="1" name=""/>
+        <p:cNvGrpSpPr/>
+        <p:nvPr/>
+      </p:nvGrpSpPr>
+      <p:grpSpPr>
+        <a:xfrm>
+          <a:off x="0" y="0"/>
+          <a:ext cx="0" cy="0"/>
+          <a:chOff x="0" y="0"/>
+          <a:chExt cx="0" cy="0"/>
+        </a:xfrm>
+      </p:grpSpPr>
+      <p:sp useBgFill="1">
+        <p:nvSpPr>
+          <p:cNvPr id="29" name="Rectangle 28">
+            <a:extLst>
+              <a:ext uri="{FF2B5EF4-FFF2-40B4-BE49-F238E27FC236}">
+                <a16:creationId xmlns:a16="http://schemas.microsoft.com/office/drawing/2014/main" id="{769960A3-4EE1-43D2-ABFC-C7A03ED21489}"/>
+              </a:ext>
+              <a:ext uri="{C183D7F6-B498-43B3-948B-1728B52AA6E4}">
+                <adec:decorative xmlns:adec="http://schemas.microsoft.com/office/drawing/2017/decorative" val="1"/>
+              </a:ext>
+            </a:extLst>
+          </p:cNvPr>
+          <p:cNvSpPr>
+            <a:spLocks noGrp="1" noRot="1" noChangeAspect="1" noMove="1" noResize="1" noEditPoints="1" noAdjustHandles="1" noChangeArrowheads="1" noChangeShapeType="1" noTextEdit="1"/>
+          </p:cNvSpPr>
+          <p:nvPr>
+            <p:extLst>
+              <p:ext uri="{386F3935-93C4-4BCD-93E2-E3B085C9AB24}">
+                <p16:designElem xmlns:p16="http://schemas.microsoft.com/office/powerpoint/2015/main" val="1"/>
+              </p:ext>
+            </p:extLst>
+          </p:nvPr>
+        </p:nvSpPr>
+        <p:spPr>
+          <a:xfrm>
+            <a:off x="0" y="0"/>
+            <a:ext cx="12192000" cy="6858000"/>
+          </a:xfrm>
+          <a:prstGeom prst="rect">
+            <a:avLst/>
+          </a:prstGeom>
+          <a:ln>
+            <a:noFill/>
+          </a:ln>
+        </p:spPr>
+        <p:style>
+          <a:lnRef idx="2">
+            <a:schemeClr val="accent1">
+              <a:shade val="50000"/>
+            </a:schemeClr>
+          </a:lnRef>
+          <a:fillRef idx="1">
+            <a:schemeClr val="accent1"/>
+          </a:fillRef>
+          <a:effectRef idx="0">
+            <a:schemeClr val="accent1"/>
+          </a:effectRef>
+          <a:fontRef idx="minor">
+            <a:schemeClr val="lt1"/>
+          </a:fontRef>
+        </p:style>
+        <p:txBody>
+          <a:bodyPr rtlCol="0" anchor="ctr"/>
+          <a:lstStyle/>
+          <a:p>
+            <a:pPr algn="ctr"/>
+            <a:endParaRPr lang="en-US"/>
+          </a:p>
+        </p:txBody>
+      </p:sp>
+      <p:sp>
+        <p:nvSpPr>
+          <p:cNvPr id="2" name="Tittel 1">
+            <a:extLst>
+              <a:ext uri="{FF2B5EF4-FFF2-40B4-BE49-F238E27FC236}">
+                <a16:creationId xmlns:a16="http://schemas.microsoft.com/office/drawing/2014/main" id="{1BA07730-02EE-93B0-64EF-F287BD770121}"/>
+              </a:ext>
+            </a:extLst>
+          </p:cNvPr>
+          <p:cNvSpPr>
+            <a:spLocks noGrp="1"/>
+          </p:cNvSpPr>
+          <p:nvPr>
+            <p:ph type="title"/>
+          </p:nvPr>
+        </p:nvSpPr>
+        <p:spPr>
+          <a:xfrm>
+            <a:off x="913795" y="609600"/>
+            <a:ext cx="10353762" cy="1164772"/>
+          </a:xfrm>
+        </p:spPr>
+        <p:txBody>
+          <a:bodyPr>
+            <a:normAutofit/>
+          </a:bodyPr>
+          <a:lstStyle/>
+          <a:p>
+            <a:r>
+              <a:rPr lang="nb-NO"/>
+              <a:t>Krav</a:t>
+            </a:r>
+            <a:endParaRPr lang="en-US"/>
+          </a:p>
+        </p:txBody>
+      </p:sp>
+      <p:pic>
+        <p:nvPicPr>
+          <p:cNvPr id="31" name="Picture 30">
+            <a:extLst>
+              <a:ext uri="{FF2B5EF4-FFF2-40B4-BE49-F238E27FC236}">
+                <a16:creationId xmlns:a16="http://schemas.microsoft.com/office/drawing/2014/main" id="{16ABCF9F-46A6-4370-8EC8-B1EDB4510B54}"/>
+              </a:ext>
+              <a:ext uri="{C183D7F6-B498-43B3-948B-1728B52AA6E4}">
+                <adec:decorative xmlns:adec="http://schemas.microsoft.com/office/drawing/2017/decorative" val="1"/>
+              </a:ext>
+            </a:extLst>
+          </p:cNvPr>
+          <p:cNvPicPr preferRelativeResize="0">
+            <a:picLocks noGrp="1" noRot="1" noChangeAspect="1" noMove="1" noResize="1" noEditPoints="1" noAdjustHandles="1" noChangeArrowheads="1" noChangeShapeType="1" noCrop="1"/>
+          </p:cNvPicPr>
+          <p:nvPr>
+            <p:extLst>
+              <p:ext uri="{386F3935-93C4-4BCD-93E2-E3B085C9AB24}">
+                <p16:designElem xmlns:p16="http://schemas.microsoft.com/office/powerpoint/2015/main" val="1"/>
+              </p:ext>
+            </p:extLst>
+          </p:nvPr>
+        </p:nvPicPr>
+        <p:blipFill rotWithShape="1">
+          <a:blip r:embed="rId3">
+            <a:extLst>
+              <a:ext uri="{28A0092B-C50C-407E-A947-70E740481C1C}">
+                <a14:useLocalDpi xmlns:a14="http://schemas.microsoft.com/office/drawing/2010/main" val="0"/>
+              </a:ext>
+            </a:extLst>
+          </a:blip>
+          <a:srcRect l="798" t="2669" r="616"/>
+          <a:stretch/>
+        </p:blipFill>
+        <p:spPr>
+          <a:xfrm>
+            <a:off x="-1" y="2046514"/>
+            <a:ext cx="12192001" cy="4811485"/>
+          </a:xfrm>
+          <a:prstGeom prst="rect">
+            <a:avLst/>
+          </a:prstGeom>
+          <a:effectLst>
+            <a:innerShdw blurRad="63500" dist="50800" dir="16200000">
+              <a:prstClr val="black">
+                <a:alpha val="50000"/>
+              </a:prstClr>
+            </a:innerShdw>
+          </a:effectLst>
+        </p:spPr>
+      </p:pic>
+      <p:sp>
+        <p:nvSpPr>
+          <p:cNvPr id="3" name="Plassholder for innhold 2">
+            <a:extLst>
+              <a:ext uri="{FF2B5EF4-FFF2-40B4-BE49-F238E27FC236}">
+                <a16:creationId xmlns:a16="http://schemas.microsoft.com/office/drawing/2014/main" id="{BB0866E6-7FE6-C2BF-6C25-1978C6F3F302}"/>
+              </a:ext>
+            </a:extLst>
+          </p:cNvPr>
+          <p:cNvSpPr>
+            <a:spLocks noGrp="1"/>
+          </p:cNvSpPr>
+          <p:nvPr>
+            <p:ph idx="1"/>
+          </p:nvPr>
+        </p:nvSpPr>
+        <p:spPr>
+          <a:xfrm>
+            <a:off x="1235528" y="2481943"/>
+            <a:ext cx="9710296" cy="3309258"/>
+          </a:xfrm>
+        </p:spPr>
+        <p:txBody>
+          <a:bodyPr>
+            <a:normAutofit/>
+          </a:bodyPr>
+          <a:lstStyle/>
+          <a:p>
+            <a:r>
+              <a:rPr lang="nb-NO" dirty="0"/>
+              <a:t>Operativsystem: Windows, Linux, MacOS</a:t>
+            </a:r>
+          </a:p>
+          <a:p>
+            <a:r>
+              <a:rPr lang="nb-NO" dirty="0"/>
+              <a:t>Noe som kan kjøre </a:t>
+            </a:r>
+            <a:r>
+              <a:rPr lang="nb-NO" dirty="0" err="1"/>
+              <a:t>Docker</a:t>
+            </a:r>
+            <a:r>
+              <a:rPr lang="nb-NO" dirty="0"/>
+              <a:t>-API kompatibel konteiner</a:t>
+            </a:r>
+          </a:p>
+          <a:p>
+            <a:pPr lvl="1"/>
+            <a:r>
+              <a:rPr lang="nb-NO" dirty="0" err="1"/>
+              <a:t>Docker</a:t>
+            </a:r>
+            <a:r>
+              <a:rPr lang="nb-NO" dirty="0"/>
+              <a:t> Desktop</a:t>
+            </a:r>
+          </a:p>
+        </p:txBody>
+      </p:sp>
+    </p:spTree>
+    <p:extLst>
+      <p:ext uri="{BB962C8B-B14F-4D97-AF65-F5344CB8AC3E}">
+        <p14:creationId xmlns:p14="http://schemas.microsoft.com/office/powerpoint/2010/main" val="3364482460"/>
+      </p:ext>
+    </p:extLst>
+  </p:cSld>
+  <p:clrMapOvr>
+    <a:masterClrMapping/>
+  </p:clrMapOvr>
+</p:sld>
+</file>
+
+<file path=ppt/slides/slide8.xml><?xml version="1.0" encoding="utf-8"?>
+<p:sld xmlns:a="http://schemas.openxmlformats.org/drawingml/2006/main" xmlns:r="http://schemas.openxmlformats.org/officeDocument/2006/relationships" xmlns:p="http://schemas.openxmlformats.org/presentationml/2006/main">
+  <p:cSld>
+    <p:spTree>
+      <p:nvGrpSpPr>
+        <p:cNvPr id="1" name=""/>
+        <p:cNvGrpSpPr/>
+        <p:nvPr/>
+      </p:nvGrpSpPr>
+      <p:grpSpPr>
+        <a:xfrm>
+          <a:off x="0" y="0"/>
+          <a:ext cx="0" cy="0"/>
+          <a:chOff x="0" y="0"/>
+          <a:chExt cx="0" cy="0"/>
+        </a:xfrm>
+      </p:grpSpPr>
+      <p:sp>
+        <p:nvSpPr>
+          <p:cNvPr id="2" name="Tittel 1">
+            <a:extLst>
+              <a:ext uri="{FF2B5EF4-FFF2-40B4-BE49-F238E27FC236}">
+                <a16:creationId xmlns:a16="http://schemas.microsoft.com/office/drawing/2014/main" id="{FB9460F5-CCD3-3AA7-C255-28D353138B2D}"/>
+              </a:ext>
+            </a:extLst>
+          </p:cNvPr>
+          <p:cNvSpPr>
+            <a:spLocks noGrp="1"/>
+          </p:cNvSpPr>
+          <p:nvPr>
+            <p:ph type="title"/>
+          </p:nvPr>
+        </p:nvSpPr>
+        <p:spPr/>
+        <p:txBody>
+          <a:bodyPr/>
+          <a:lstStyle/>
+          <a:p>
+            <a:r>
+              <a:rPr lang="nb-NO" dirty="0"/>
+              <a:t>Løsning</a:t>
+            </a:r>
+            <a:endParaRPr lang="en-US" dirty="0"/>
+          </a:p>
+        </p:txBody>
+      </p:sp>
+      <p:sp>
+        <p:nvSpPr>
+          <p:cNvPr id="3" name="Plassholder for innhold 2">
+            <a:extLst>
+              <a:ext uri="{FF2B5EF4-FFF2-40B4-BE49-F238E27FC236}">
+                <a16:creationId xmlns:a16="http://schemas.microsoft.com/office/drawing/2014/main" id="{466BBD86-87FE-483A-53D5-0C835B428261}"/>
+              </a:ext>
+            </a:extLst>
+          </p:cNvPr>
+          <p:cNvSpPr>
+            <a:spLocks noGrp="1"/>
+          </p:cNvSpPr>
+          <p:nvPr>
+            <p:ph idx="1"/>
+          </p:nvPr>
+        </p:nvSpPr>
+        <p:spPr/>
+        <p:txBody>
+          <a:bodyPr/>
+          <a:lstStyle/>
+          <a:p>
+            <a:endParaRPr lang="nb-NO" dirty="0"/>
+          </a:p>
+        </p:txBody>
+      </p:sp>
+    </p:spTree>
+    <p:extLst>
+      <p:ext uri="{BB962C8B-B14F-4D97-AF65-F5344CB8AC3E}">
+        <p14:creationId xmlns:p14="http://schemas.microsoft.com/office/powerpoint/2010/main" val="1701218987"/>
+      </p:ext>
+    </p:extLst>
+  </p:cSld>
+  <p:clrMapOvr>
+    <a:masterClrMapping/>
+  </p:clrMapOvr>
+</p:sld>
+</file>
+
+<file path=ppt/slides/slide9.xml><?xml version="1.0" encoding="utf-8"?>
+<p:sld xmlns:a="http://schemas.openxmlformats.org/drawingml/2006/main" xmlns:r="http://schemas.openxmlformats.org/officeDocument/2006/relationships" xmlns:p="http://schemas.openxmlformats.org/presentationml/2006/main">
+  <p:cSld>
+    <p:bg>
+      <p:bgPr>
+        <a:blipFill rotWithShape="1">
+          <a:blip r:embed="rId2">
+            <a:duotone>
+              <a:schemeClr val="bg2">
+                <a:shade val="80000"/>
+                <a:lumMod val="80000"/>
+              </a:schemeClr>
+              <a:schemeClr val="bg2">
+                <a:tint val="98000"/>
+              </a:schemeClr>
+            </a:duotone>
+          </a:blip>
+          <a:stretch/>
+        </a:blipFill>
+        <a:effectLst/>
+      </p:bgPr>
+    </p:bg>
+    <p:spTree>
+      <p:nvGrpSpPr>
+        <p:cNvPr id="1" name=""/>
+        <p:cNvGrpSpPr/>
+        <p:nvPr/>
+      </p:nvGrpSpPr>
+      <p:grpSpPr>
+        <a:xfrm>
+          <a:off x="0" y="0"/>
+          <a:ext cx="0" cy="0"/>
+          <a:chOff x="0" y="0"/>
+          <a:chExt cx="0" cy="0"/>
+        </a:xfrm>
+      </p:grpSpPr>
+      <p:sp>
+        <p:nvSpPr>
+          <p:cNvPr id="2" name="Tittel 1">
+            <a:extLst>
+              <a:ext uri="{FF2B5EF4-FFF2-40B4-BE49-F238E27FC236}">
+                <a16:creationId xmlns:a16="http://schemas.microsoft.com/office/drawing/2014/main" id="{FD574702-5A24-F133-9C34-FF6350A60004}"/>
+              </a:ext>
+            </a:extLst>
+          </p:cNvPr>
+          <p:cNvSpPr>
+            <a:spLocks noGrp="1"/>
+          </p:cNvSpPr>
+          <p:nvPr>
+            <p:ph type="title"/>
+          </p:nvPr>
+        </p:nvSpPr>
+        <p:spPr>
+          <a:xfrm>
+            <a:off x="5417568" y="2619416"/>
+            <a:ext cx="5441285" cy="2364964"/>
+          </a:xfrm>
+        </p:spPr>
+        <p:txBody>
+          <a:bodyPr vert="horz" lIns="91440" tIns="45720" rIns="91440" bIns="45720" rtlCol="0" anchor="b">
+            <a:normAutofit fontScale="90000"/>
+          </a:bodyPr>
+          <a:lstStyle/>
+          <a:p>
+            <a:r>
+              <a:rPr lang="nb-NO" sz="5400" dirty="0" err="1"/>
+              <a:t>IApiMarker</a:t>
+            </a:r>
+            <a:br>
+              <a:rPr lang="nb-NO" sz="5400" dirty="0"/>
+            </a:br>
+            <a:br>
+              <a:rPr lang="nb-NO" sz="5400" dirty="0"/>
+            </a:br>
+            <a:r>
+              <a:rPr lang="nb-NO" sz="4400" dirty="0"/>
+              <a:t>Simpelt Interface, som refererer til prosjektet.</a:t>
+            </a:r>
+          </a:p>
+        </p:txBody>
+      </p:sp>
+      <p:pic>
+        <p:nvPicPr>
+          <p:cNvPr id="27" name="Picture 26">
+            <a:extLst>
+              <a:ext uri="{FF2B5EF4-FFF2-40B4-BE49-F238E27FC236}">
+                <a16:creationId xmlns:a16="http://schemas.microsoft.com/office/drawing/2014/main" id="{BBFC95FA-585A-433A-8ECF-D85700125B71}"/>
+              </a:ext>
+              <a:ext uri="{C183D7F6-B498-43B3-948B-1728B52AA6E4}">
+                <adec:decorative xmlns:adec="http://schemas.microsoft.com/office/drawing/2017/decorative" val="1"/>
+              </a:ext>
+            </a:extLst>
+          </p:cNvPr>
+          <p:cNvPicPr>
+            <a:picLocks noGrp="1" noRot="1" noChangeAspect="1" noMove="1" noResize="1" noEditPoints="1" noAdjustHandles="1" noChangeArrowheads="1" noChangeShapeType="1" noCrop="1"/>
+          </p:cNvPicPr>
+          <p:nvPr>
+            <p:extLst>
+              <p:ext uri="{386F3935-93C4-4BCD-93E2-E3B085C9AB24}">
+                <p16:designElem xmlns:p16="http://schemas.microsoft.com/office/powerpoint/2015/main" val="1"/>
+              </p:ext>
+            </p:extLst>
+          </p:nvPr>
+        </p:nvPicPr>
+        <p:blipFill rotWithShape="1">
+          <a:blip r:embed="rId3">
+            <a:extLst>
+              <a:ext uri="{28A0092B-C50C-407E-A947-70E740481C1C}">
+                <a14:useLocalDpi xmlns:a14="http://schemas.microsoft.com/office/drawing/2010/main" val="0"/>
+              </a:ext>
+            </a:extLst>
+          </a:blip>
+          <a:srcRect t="964" r="2807" b="1446"/>
+          <a:stretch/>
+        </p:blipFill>
+        <p:spPr>
+          <a:xfrm>
+            <a:off x="-10649" y="1"/>
+            <a:ext cx="4690532" cy="6858000"/>
+          </a:xfrm>
+          <a:prstGeom prst="rect">
+            <a:avLst/>
+          </a:prstGeom>
+        </p:spPr>
+      </p:pic>
+      <p:pic>
+        <p:nvPicPr>
+          <p:cNvPr id="22" name="Bilde 21">
+            <a:extLst>
+              <a:ext uri="{FF2B5EF4-FFF2-40B4-BE49-F238E27FC236}">
+                <a16:creationId xmlns:a16="http://schemas.microsoft.com/office/drawing/2014/main" id="{4868EA3C-E4C3-0673-494B-866B78194CC2}"/>
+              </a:ext>
+            </a:extLst>
+          </p:cNvPr>
+          <p:cNvPicPr>
+            <a:picLocks noChangeAspect="1"/>
+          </p:cNvPicPr>
+          <p:nvPr/>
+        </p:nvPicPr>
+        <p:blipFill>
+          <a:blip r:embed="rId4"/>
+          <a:stretch>
+            <a:fillRect/>
+          </a:stretch>
+        </p:blipFill>
+        <p:spPr>
+          <a:xfrm>
+            <a:off x="643339" y="1215441"/>
+            <a:ext cx="3551912" cy="1562841"/>
+          </a:xfrm>
+          <a:prstGeom prst="rect">
+            <a:avLst/>
+          </a:prstGeom>
+        </p:spPr>
+      </p:pic>
+      <p:pic>
+        <p:nvPicPr>
+          <p:cNvPr id="7" name="Bilde 6">
+            <a:extLst>
+              <a:ext uri="{FF2B5EF4-FFF2-40B4-BE49-F238E27FC236}">
+                <a16:creationId xmlns:a16="http://schemas.microsoft.com/office/drawing/2014/main" id="{E6FCA69D-E710-1BCC-400F-F0CC9E0C6408}"/>
+              </a:ext>
+            </a:extLst>
+          </p:cNvPr>
+          <p:cNvPicPr>
+            <a:picLocks noChangeAspect="1"/>
+          </p:cNvPicPr>
+          <p:nvPr/>
+        </p:nvPicPr>
+        <p:blipFill rotWithShape="1">
+          <a:blip r:embed="rId5"/>
+          <a:srcRect t="4779" r="-2" b="4859"/>
+          <a:stretch/>
+        </p:blipFill>
+        <p:spPr>
+          <a:xfrm>
+            <a:off x="925869" y="3511127"/>
+            <a:ext cx="2986852" cy="2706794"/>
+          </a:xfrm>
+          <a:prstGeom prst="rect">
+            <a:avLst/>
+          </a:prstGeom>
+        </p:spPr>
+      </p:pic>
+    </p:spTree>
+    <p:extLst>
+      <p:ext uri="{BB962C8B-B14F-4D97-AF65-F5344CB8AC3E}">
+        <p14:creationId xmlns:p14="http://schemas.microsoft.com/office/powerpoint/2010/main" val="1298978767"/>
       </p:ext>
     </p:extLst>
   </p:cSld>
@@ -7539,4 +9699,299 @@
     </a:ext>
   </a:extLst>
 </a:theme>
+</file>
+
+<file path=ppt/theme/theme2.xml><?xml version="1.0" encoding="utf-8"?>
+<a:theme xmlns:a="http://schemas.openxmlformats.org/drawingml/2006/main" name="Office-tema">
+  <a:themeElements>
+    <a:clrScheme name="Office">
+      <a:dk1>
+        <a:sysClr val="windowText" lastClr="000000"/>
+      </a:dk1>
+      <a:lt1>
+        <a:sysClr val="window" lastClr="FFFFFF"/>
+      </a:lt1>
+      <a:dk2>
+        <a:srgbClr val="44546A"/>
+      </a:dk2>
+      <a:lt2>
+        <a:srgbClr val="E7E6E6"/>
+      </a:lt2>
+      <a:accent1>
+        <a:srgbClr val="4472C4"/>
+      </a:accent1>
+      <a:accent2>
+        <a:srgbClr val="ED7D31"/>
+      </a:accent2>
+      <a:accent3>
+        <a:srgbClr val="A5A5A5"/>
+      </a:accent3>
+      <a:accent4>
+        <a:srgbClr val="FFC000"/>
+      </a:accent4>
+      <a:accent5>
+        <a:srgbClr val="5B9BD5"/>
+      </a:accent5>
+      <a:accent6>
+        <a:srgbClr val="70AD47"/>
+      </a:accent6>
+      <a:hlink>
+        <a:srgbClr val="0563C1"/>
+      </a:hlink>
+      <a:folHlink>
+        <a:srgbClr val="954F72"/>
+      </a:folHlink>
+    </a:clrScheme>
+    <a:fontScheme name="Office">
+      <a:majorFont>
+        <a:latin typeface="Calibri Light" panose="020F0302020204030204"/>
+        <a:ea typeface=""/>
+        <a:cs typeface=""/>
+        <a:font script="Jpan" typeface="游ゴシック Light"/>
+        <a:font script="Hang" typeface="맑은 고딕"/>
+        <a:font script="Hans" typeface="等线 Light"/>
+        <a:font script="Hant" typeface="新細明體"/>
+        <a:font script="Arab" typeface="Times New Roman"/>
+        <a:font script="Hebr" typeface="Times New Roman"/>
+        <a:font script="Thai" typeface="Angsana New"/>
+        <a:font script="Ethi" typeface="Nyala"/>
+        <a:font script="Beng" typeface="Vrinda"/>
+        <a:font script="Gujr" typeface="Shruti"/>
+        <a:font script="Khmr" typeface="MoolBoran"/>
+        <a:font script="Knda" typeface="Tunga"/>
+        <a:font script="Guru" typeface="Raavi"/>
+        <a:font script="Cans" typeface="Euphemia"/>
+        <a:font script="Cher" typeface="Plantagenet Cherokee"/>
+        <a:font script="Yiii" typeface="Microsoft Yi Baiti"/>
+        <a:font script="Tibt" typeface="Microsoft Himalaya"/>
+        <a:font script="Thaa" typeface="MV Boli"/>
+        <a:font script="Deva" typeface="Mangal"/>
+        <a:font script="Telu" typeface="Gautami"/>
+        <a:font script="Taml" typeface="Latha"/>
+        <a:font script="Syrc" typeface="Estrangelo Edessa"/>
+        <a:font script="Orya" typeface="Kalinga"/>
+        <a:font script="Mlym" typeface="Kartika"/>
+        <a:font script="Laoo" typeface="DokChampa"/>
+        <a:font script="Sinh" typeface="Iskoola Pota"/>
+        <a:font script="Mong" typeface="Mongolian Baiti"/>
+        <a:font script="Viet" typeface="Times New Roman"/>
+        <a:font script="Uigh" typeface="Microsoft Uighur"/>
+        <a:font script="Geor" typeface="Sylfaen"/>
+        <a:font script="Armn" typeface="Arial"/>
+        <a:font script="Bugi" typeface="Leelawadee UI"/>
+        <a:font script="Bopo" typeface="Microsoft JhengHei"/>
+        <a:font script="Java" typeface="Javanese Text"/>
+        <a:font script="Lisu" typeface="Segoe UI"/>
+        <a:font script="Mymr" typeface="Myanmar Text"/>
+        <a:font script="Nkoo" typeface="Ebrima"/>
+        <a:font script="Olck" typeface="Nirmala UI"/>
+        <a:font script="Osma" typeface="Ebrima"/>
+        <a:font script="Phag" typeface="Phagspa"/>
+        <a:font script="Syrn" typeface="Estrangelo Edessa"/>
+        <a:font script="Syrj" typeface="Estrangelo Edessa"/>
+        <a:font script="Syre" typeface="Estrangelo Edessa"/>
+        <a:font script="Sora" typeface="Nirmala UI"/>
+        <a:font script="Tale" typeface="Microsoft Tai Le"/>
+        <a:font script="Talu" typeface="Microsoft New Tai Lue"/>
+        <a:font script="Tfng" typeface="Ebrima"/>
+      </a:majorFont>
+      <a:minorFont>
+        <a:latin typeface="Calibri" panose="020F0502020204030204"/>
+        <a:ea typeface=""/>
+        <a:cs typeface=""/>
+        <a:font script="Jpan" typeface="游ゴシック"/>
+        <a:font script="Hang" typeface="맑은 고딕"/>
+        <a:font script="Hans" typeface="等线"/>
+        <a:font script="Hant" typeface="新細明體"/>
+        <a:font script="Arab" typeface="Arial"/>
+        <a:font script="Hebr" typeface="Arial"/>
+        <a:font script="Thai" typeface="Cordia New"/>
+        <a:font script="Ethi" typeface="Nyala"/>
+        <a:font script="Beng" typeface="Vrinda"/>
+        <a:font script="Gujr" typeface="Shruti"/>
+        <a:font script="Khmr" typeface="DaunPenh"/>
+        <a:font script="Knda" typeface="Tunga"/>
+        <a:font script="Guru" typeface="Raavi"/>
+        <a:font script="Cans" typeface="Euphemia"/>
+        <a:font script="Cher" typeface="Plantagenet Cherokee"/>
+        <a:font script="Yiii" typeface="Microsoft Yi Baiti"/>
+        <a:font script="Tibt" typeface="Microsoft Himalaya"/>
+        <a:font script="Thaa" typeface="MV Boli"/>
+        <a:font script="Deva" typeface="Mangal"/>
+        <a:font script="Telu" typeface="Gautami"/>
+        <a:font script="Taml" typeface="Latha"/>
+        <a:font script="Syrc" typeface="Estrangelo Edessa"/>
+        <a:font script="Orya" typeface="Kalinga"/>
+        <a:font script="Mlym" typeface="Kartika"/>
+        <a:font script="Laoo" typeface="DokChampa"/>
+        <a:font script="Sinh" typeface="Iskoola Pota"/>
+        <a:font script="Mong" typeface="Mongolian Baiti"/>
+        <a:font script="Viet" typeface="Arial"/>
+        <a:font script="Uigh" typeface="Microsoft Uighur"/>
+        <a:font script="Geor" typeface="Sylfaen"/>
+        <a:font script="Armn" typeface="Arial"/>
+        <a:font script="Bugi" typeface="Leelawadee UI"/>
+        <a:font script="Bopo" typeface="Microsoft JhengHei"/>
+        <a:font script="Java" typeface="Javanese Text"/>
+        <a:font script="Lisu" typeface="Segoe UI"/>
+        <a:font script="Mymr" typeface="Myanmar Text"/>
+        <a:font script="Nkoo" typeface="Ebrima"/>
+        <a:font script="Olck" typeface="Nirmala UI"/>
+        <a:font script="Osma" typeface="Ebrima"/>
+        <a:font script="Phag" typeface="Phagspa"/>
+        <a:font script="Syrn" typeface="Estrangelo Edessa"/>
+        <a:font script="Syrj" typeface="Estrangelo Edessa"/>
+        <a:font script="Syre" typeface="Estrangelo Edessa"/>
+        <a:font script="Sora" typeface="Nirmala UI"/>
+        <a:font script="Tale" typeface="Microsoft Tai Le"/>
+        <a:font script="Talu" typeface="Microsoft New Tai Lue"/>
+        <a:font script="Tfng" typeface="Ebrima"/>
+      </a:minorFont>
+    </a:fontScheme>
+    <a:fmtScheme name="Office">
+      <a:fillStyleLst>
+        <a:solidFill>
+          <a:schemeClr val="phClr"/>
+        </a:solidFill>
+        <a:gradFill rotWithShape="1">
+          <a:gsLst>
+            <a:gs pos="0">
+              <a:schemeClr val="phClr">
+                <a:lumMod val="110000"/>
+                <a:satMod val="105000"/>
+                <a:tint val="67000"/>
+              </a:schemeClr>
+            </a:gs>
+            <a:gs pos="50000">
+              <a:schemeClr val="phClr">
+                <a:lumMod val="105000"/>
+                <a:satMod val="103000"/>
+                <a:tint val="73000"/>
+              </a:schemeClr>
+            </a:gs>
+            <a:gs pos="100000">
+              <a:schemeClr val="phClr">
+                <a:lumMod val="105000"/>
+                <a:satMod val="109000"/>
+                <a:tint val="81000"/>
+              </a:schemeClr>
+            </a:gs>
+          </a:gsLst>
+          <a:lin ang="5400000" scaled="0"/>
+        </a:gradFill>
+        <a:gradFill rotWithShape="1">
+          <a:gsLst>
+            <a:gs pos="0">
+              <a:schemeClr val="phClr">
+                <a:satMod val="103000"/>
+                <a:lumMod val="102000"/>
+                <a:tint val="94000"/>
+              </a:schemeClr>
+            </a:gs>
+            <a:gs pos="50000">
+              <a:schemeClr val="phClr">
+                <a:satMod val="110000"/>
+                <a:lumMod val="100000"/>
+                <a:shade val="100000"/>
+              </a:schemeClr>
+            </a:gs>
+            <a:gs pos="100000">
+              <a:schemeClr val="phClr">
+                <a:lumMod val="99000"/>
+                <a:satMod val="120000"/>
+                <a:shade val="78000"/>
+              </a:schemeClr>
+            </a:gs>
+          </a:gsLst>
+          <a:lin ang="5400000" scaled="0"/>
+        </a:gradFill>
+      </a:fillStyleLst>
+      <a:lnStyleLst>
+        <a:ln w="6350" cap="flat" cmpd="sng" algn="ctr">
+          <a:solidFill>
+            <a:schemeClr val="phClr"/>
+          </a:solidFill>
+          <a:prstDash val="solid"/>
+          <a:miter lim="800000"/>
+        </a:ln>
+        <a:ln w="12700" cap="flat" cmpd="sng" algn="ctr">
+          <a:solidFill>
+            <a:schemeClr val="phClr"/>
+          </a:solidFill>
+          <a:prstDash val="solid"/>
+          <a:miter lim="800000"/>
+        </a:ln>
+        <a:ln w="19050" cap="flat" cmpd="sng" algn="ctr">
+          <a:solidFill>
+            <a:schemeClr val="phClr"/>
+          </a:solidFill>
+          <a:prstDash val="solid"/>
+          <a:miter lim="800000"/>
+        </a:ln>
+      </a:lnStyleLst>
+      <a:effectStyleLst>
+        <a:effectStyle>
+          <a:effectLst/>
+        </a:effectStyle>
+        <a:effectStyle>
+          <a:effectLst/>
+        </a:effectStyle>
+        <a:effectStyle>
+          <a:effectLst>
+            <a:outerShdw blurRad="57150" dist="19050" dir="5400000" algn="ctr" rotWithShape="0">
+              <a:srgbClr val="000000">
+                <a:alpha val="63000"/>
+              </a:srgbClr>
+            </a:outerShdw>
+          </a:effectLst>
+        </a:effectStyle>
+      </a:effectStyleLst>
+      <a:bgFillStyleLst>
+        <a:solidFill>
+          <a:schemeClr val="phClr"/>
+        </a:solidFill>
+        <a:solidFill>
+          <a:schemeClr val="phClr">
+            <a:tint val="95000"/>
+            <a:satMod val="170000"/>
+          </a:schemeClr>
+        </a:solidFill>
+        <a:gradFill rotWithShape="1">
+          <a:gsLst>
+            <a:gs pos="0">
+              <a:schemeClr val="phClr">
+                <a:tint val="93000"/>
+                <a:satMod val="150000"/>
+                <a:shade val="98000"/>
+                <a:lumMod val="102000"/>
+              </a:schemeClr>
+            </a:gs>
+            <a:gs pos="50000">
+              <a:schemeClr val="phClr">
+                <a:tint val="98000"/>
+                <a:satMod val="130000"/>
+                <a:shade val="90000"/>
+                <a:lumMod val="103000"/>
+              </a:schemeClr>
+            </a:gs>
+            <a:gs pos="100000">
+              <a:schemeClr val="phClr">
+                <a:shade val="63000"/>
+                <a:satMod val="120000"/>
+              </a:schemeClr>
+            </a:gs>
+          </a:gsLst>
+          <a:lin ang="5400000" scaled="0"/>
+        </a:gradFill>
+      </a:bgFillStyleLst>
+    </a:fmtScheme>
+  </a:themeElements>
+  <a:objectDefaults/>
+  <a:extraClrSchemeLst/>
+  <a:extLst>
+    <a:ext uri="{05A4C25C-085E-4340-85A3-A5531E510DB2}">
+      <thm15:themeFamily xmlns:thm15="http://schemas.microsoft.com/office/thememl/2012/main" name="Office Theme" id="{62F939B6-93AF-4DB8-9C6B-D6C7DFDC589F}" vid="{4A3C46E8-61CC-4603-A589-7422A47A8E4A}"/>
+    </a:ext>
+  </a:extLst>
+</a:theme>
 </file>
</xml_diff>